<commit_message>
correct animations in diapo
</commit_message>
<xml_diff>
--- a/Diaporama/diaporama.pptx
+++ b/Diaporama/diaporama.pptx
@@ -255,7 +255,7 @@
           <a:p>
             <a:fld id="{781248F0-92D3-44B8-A941-3F7889BEA284}" type="datetimeFigureOut">
               <a:rPr lang="fr-FR" smtClean="0"/>
-              <a:t>04/06/2021</a:t>
+              <a:t>05/06/2021</a:t>
             </a:fld>
             <a:endParaRPr lang="fr-FR"/>
           </a:p>
@@ -710,7 +710,7 @@
           <a:p>
             <a:fld id="{89FFA7D1-071F-4D89-AA59-3EA0DDD2F705}" type="datetime1">
               <a:rPr lang="fr-FR" smtClean="0"/>
-              <a:t>04/06/2021</a:t>
+              <a:t>05/06/2021</a:t>
             </a:fld>
             <a:endParaRPr lang="fr-FR"/>
           </a:p>
@@ -875,7 +875,7 @@
           <a:p>
             <a:fld id="{36F503A2-2F46-4B3B-9A48-62A2D380A6FB}" type="datetime1">
               <a:rPr lang="fr-FR" smtClean="0"/>
-              <a:t>04/06/2021</a:t>
+              <a:t>05/06/2021</a:t>
             </a:fld>
             <a:endParaRPr lang="fr-FR"/>
           </a:p>
@@ -1050,7 +1050,7 @@
           <a:p>
             <a:fld id="{8CCBC686-DF3B-4BB6-9496-30464B02D800}" type="datetime1">
               <a:rPr lang="fr-FR" smtClean="0"/>
-              <a:t>04/06/2021</a:t>
+              <a:t>05/06/2021</a:t>
             </a:fld>
             <a:endParaRPr lang="fr-FR"/>
           </a:p>
@@ -1215,7 +1215,7 @@
           <a:p>
             <a:fld id="{F6A6C7BF-5982-43CA-9A14-B7DAD1F95BA3}" type="datetime1">
               <a:rPr lang="fr-FR" smtClean="0"/>
-              <a:t>04/06/2021</a:t>
+              <a:t>05/06/2021</a:t>
             </a:fld>
             <a:endParaRPr lang="fr-FR"/>
           </a:p>
@@ -1454,7 +1454,7 @@
           <a:p>
             <a:fld id="{0B5D2129-7C47-4CF6-877D-FA09C3F64CDA}" type="datetime1">
               <a:rPr lang="fr-FR" smtClean="0"/>
-              <a:t>04/06/2021</a:t>
+              <a:t>05/06/2021</a:t>
             </a:fld>
             <a:endParaRPr lang="fr-FR"/>
           </a:p>
@@ -1544,7 +1544,7 @@
           <a:p>
             <a:fld id="{304F83C5-8F57-445E-BC20-B8458288444A}" type="datetime1">
               <a:rPr lang="fr-FR" smtClean="0"/>
-              <a:t>04/06/2021</a:t>
+              <a:t>05/06/2021</a:t>
             </a:fld>
             <a:endParaRPr lang="fr-FR"/>
           </a:p>
@@ -1918,7 +1918,7 @@
           <a:p>
             <a:fld id="{DC1A622E-B78A-4CDC-8700-9CF99250DAC9}" type="datetime1">
               <a:rPr lang="fr-FR" smtClean="0"/>
-              <a:t>04/06/2021</a:t>
+              <a:t>05/06/2021</a:t>
             </a:fld>
             <a:endParaRPr lang="fr-FR"/>
           </a:p>
@@ -2173,7 +2173,7 @@
           <a:p>
             <a:fld id="{A832D48E-3AFD-4131-8308-9F277B9D005E}" type="datetime1">
               <a:rPr lang="fr-FR" smtClean="0"/>
-              <a:t>04/06/2021</a:t>
+              <a:t>05/06/2021</a:t>
             </a:fld>
             <a:endParaRPr lang="fr-FR"/>
           </a:p>
@@ -2263,7 +2263,7 @@
           <a:p>
             <a:fld id="{75720ED2-AC41-40AA-8E6A-15385B1E8A24}" type="datetime1">
               <a:rPr lang="fr-FR" smtClean="0"/>
-              <a:t>04/06/2021</a:t>
+              <a:t>05/06/2021</a:t>
             </a:fld>
             <a:endParaRPr lang="fr-FR"/>
           </a:p>
@@ -2537,7 +2537,7 @@
           <a:p>
             <a:fld id="{E94AF03A-E309-4A7D-9871-FCE781444D2C}" type="datetime1">
               <a:rPr lang="fr-FR" smtClean="0"/>
-              <a:t>04/06/2021</a:t>
+              <a:t>05/06/2021</a:t>
             </a:fld>
             <a:endParaRPr lang="fr-FR"/>
           </a:p>
@@ -2809,7 +2809,7 @@
           <a:p>
             <a:fld id="{8E07A3D4-9E33-4C46-955C-BCA43B4327AE}" type="datetime1">
               <a:rPr lang="fr-FR" smtClean="0"/>
-              <a:t>04/06/2021</a:t>
+              <a:t>05/06/2021</a:t>
             </a:fld>
             <a:endParaRPr lang="fr-FR"/>
           </a:p>
@@ -3109,7 +3109,7 @@
           <a:p>
             <a:fld id="{3436EB21-DFC2-4CAA-BA39-89726757DE4C}" type="datetime1">
               <a:rPr lang="fr-FR" smtClean="0"/>
-              <a:t>04/06/2021</a:t>
+              <a:t>05/06/2021</a:t>
             </a:fld>
             <a:endParaRPr lang="fr-FR"/>
           </a:p>
@@ -9541,7 +9541,1678 @@
   <p:timing>
     <p:tnLst>
       <p:par>
-        <p:cTn id="1" dur="indefinite" restart="never" nodeType="tmRoot"/>
+        <p:cTn id="1" dur="indefinite" restart="never" nodeType="tmRoot">
+          <p:childTnLst>
+            <p:seq concurrent="1" nextAc="seek">
+              <p:cTn id="2" dur="indefinite" nodeType="mainSeq">
+                <p:childTnLst>
+                  <p:par>
+                    <p:cTn id="3" fill="hold">
+                      <p:stCondLst>
+                        <p:cond delay="indefinite"/>
+                      </p:stCondLst>
+                      <p:childTnLst>
+                        <p:par>
+                          <p:cTn id="4" fill="hold">
+                            <p:stCondLst>
+                              <p:cond delay="0"/>
+                            </p:stCondLst>
+                            <p:childTnLst>
+                              <p:par>
+                                <p:cTn id="5" presetID="16" presetClass="emph" presetSubtype="0" fill="hold" nodeType="clickEffect">
+                                  <p:stCondLst>
+                                    <p:cond delay="0"/>
+                                  </p:stCondLst>
+                                  <p:iterate type="lt">
+                                    <p:tmPct val="4000"/>
+                                  </p:iterate>
+                                  <p:childTnLst>
+                                    <p:set>
+                                      <p:cBhvr override="childStyle">
+                                        <p:cTn id="6" dur="500" fill="hold"/>
+                                        <p:tgtEl>
+                                          <p:spTgt spid="3">
+                                            <p:txEl>
+                                              <p:pRg st="0" end="0"/>
+                                            </p:txEl>
+                                          </p:spTgt>
+                                        </p:tgtEl>
+                                        <p:attrNameLst>
+                                          <p:attrName>style.color</p:attrName>
+                                        </p:attrNameLst>
+                                      </p:cBhvr>
+                                      <p:to>
+                                        <p:clrVal>
+                                          <a:schemeClr val="accent2"/>
+                                        </p:clrVal>
+                                      </p:to>
+                                    </p:set>
+                                    <p:set>
+                                      <p:cBhvr>
+                                        <p:cTn id="7" dur="500" fill="hold"/>
+                                        <p:tgtEl>
+                                          <p:spTgt spid="3">
+                                            <p:txEl>
+                                              <p:pRg st="0" end="0"/>
+                                            </p:txEl>
+                                          </p:spTgt>
+                                        </p:tgtEl>
+                                        <p:attrNameLst>
+                                          <p:attrName>fillcolor</p:attrName>
+                                        </p:attrNameLst>
+                                      </p:cBhvr>
+                                      <p:to>
+                                        <p:clrVal>
+                                          <a:schemeClr val="accent2"/>
+                                        </p:clrVal>
+                                      </p:to>
+                                    </p:set>
+                                    <p:set>
+                                      <p:cBhvr>
+                                        <p:cTn id="8" dur="500" fill="hold"/>
+                                        <p:tgtEl>
+                                          <p:spTgt spid="3">
+                                            <p:txEl>
+                                              <p:pRg st="0" end="0"/>
+                                            </p:txEl>
+                                          </p:spTgt>
+                                        </p:tgtEl>
+                                        <p:attrNameLst>
+                                          <p:attrName>fill.type</p:attrName>
+                                        </p:attrNameLst>
+                                      </p:cBhvr>
+                                      <p:to>
+                                        <p:strVal val="solid"/>
+                                      </p:to>
+                                    </p:set>
+                                  </p:childTnLst>
+                                </p:cTn>
+                              </p:par>
+                              <p:par>
+                                <p:cTn id="9" presetID="16" presetClass="emph" presetSubtype="0" fill="hold" nodeType="withEffect">
+                                  <p:stCondLst>
+                                    <p:cond delay="0"/>
+                                  </p:stCondLst>
+                                  <p:iterate type="lt">
+                                    <p:tmPct val="4000"/>
+                                  </p:iterate>
+                                  <p:childTnLst>
+                                    <p:set>
+                                      <p:cBhvr override="childStyle">
+                                        <p:cTn id="10" dur="500" fill="hold"/>
+                                        <p:tgtEl>
+                                          <p:spTgt spid="3">
+                                            <p:txEl>
+                                              <p:pRg st="1" end="1"/>
+                                            </p:txEl>
+                                          </p:spTgt>
+                                        </p:tgtEl>
+                                        <p:attrNameLst>
+                                          <p:attrName>style.color</p:attrName>
+                                        </p:attrNameLst>
+                                      </p:cBhvr>
+                                      <p:to>
+                                        <p:clrVal>
+                                          <a:schemeClr val="accent2"/>
+                                        </p:clrVal>
+                                      </p:to>
+                                    </p:set>
+                                    <p:set>
+                                      <p:cBhvr>
+                                        <p:cTn id="11" dur="500" fill="hold"/>
+                                        <p:tgtEl>
+                                          <p:spTgt spid="3">
+                                            <p:txEl>
+                                              <p:pRg st="1" end="1"/>
+                                            </p:txEl>
+                                          </p:spTgt>
+                                        </p:tgtEl>
+                                        <p:attrNameLst>
+                                          <p:attrName>fillcolor</p:attrName>
+                                        </p:attrNameLst>
+                                      </p:cBhvr>
+                                      <p:to>
+                                        <p:clrVal>
+                                          <a:schemeClr val="accent2"/>
+                                        </p:clrVal>
+                                      </p:to>
+                                    </p:set>
+                                    <p:set>
+                                      <p:cBhvr>
+                                        <p:cTn id="12" dur="500" fill="hold"/>
+                                        <p:tgtEl>
+                                          <p:spTgt spid="3">
+                                            <p:txEl>
+                                              <p:pRg st="1" end="1"/>
+                                            </p:txEl>
+                                          </p:spTgt>
+                                        </p:tgtEl>
+                                        <p:attrNameLst>
+                                          <p:attrName>fill.type</p:attrName>
+                                        </p:attrNameLst>
+                                      </p:cBhvr>
+                                      <p:to>
+                                        <p:strVal val="solid"/>
+                                      </p:to>
+                                    </p:set>
+                                  </p:childTnLst>
+                                </p:cTn>
+                              </p:par>
+                            </p:childTnLst>
+                          </p:cTn>
+                        </p:par>
+                      </p:childTnLst>
+                    </p:cTn>
+                  </p:par>
+                  <p:par>
+                    <p:cTn id="13" fill="hold">
+                      <p:stCondLst>
+                        <p:cond delay="indefinite"/>
+                      </p:stCondLst>
+                      <p:childTnLst>
+                        <p:par>
+                          <p:cTn id="14" fill="hold">
+                            <p:stCondLst>
+                              <p:cond delay="0"/>
+                            </p:stCondLst>
+                            <p:childTnLst>
+                              <p:par>
+                                <p:cTn id="15" presetID="16" presetClass="emph" presetSubtype="0" fill="hold" nodeType="clickEffect">
+                                  <p:stCondLst>
+                                    <p:cond delay="0"/>
+                                  </p:stCondLst>
+                                  <p:iterate type="lt">
+                                    <p:tmPct val="4000"/>
+                                  </p:iterate>
+                                  <p:childTnLst>
+                                    <p:set>
+                                      <p:cBhvr override="childStyle">
+                                        <p:cTn id="16" dur="500" fill="hold"/>
+                                        <p:tgtEl>
+                                          <p:spTgt spid="3">
+                                            <p:txEl>
+                                              <p:pRg st="0" end="0"/>
+                                            </p:txEl>
+                                          </p:spTgt>
+                                        </p:tgtEl>
+                                        <p:attrNameLst>
+                                          <p:attrName>style.color</p:attrName>
+                                        </p:attrNameLst>
+                                      </p:cBhvr>
+                                      <p:to>
+                                        <p:clrVal>
+                                          <a:srgbClr val="FFFFFF"/>
+                                        </p:clrVal>
+                                      </p:to>
+                                    </p:set>
+                                    <p:set>
+                                      <p:cBhvr>
+                                        <p:cTn id="17" dur="500" fill="hold"/>
+                                        <p:tgtEl>
+                                          <p:spTgt spid="3">
+                                            <p:txEl>
+                                              <p:pRg st="0" end="0"/>
+                                            </p:txEl>
+                                          </p:spTgt>
+                                        </p:tgtEl>
+                                        <p:attrNameLst>
+                                          <p:attrName>fillcolor</p:attrName>
+                                        </p:attrNameLst>
+                                      </p:cBhvr>
+                                      <p:to>
+                                        <p:clrVal>
+                                          <a:srgbClr val="FFFFFF"/>
+                                        </p:clrVal>
+                                      </p:to>
+                                    </p:set>
+                                    <p:set>
+                                      <p:cBhvr>
+                                        <p:cTn id="18" dur="500" fill="hold"/>
+                                        <p:tgtEl>
+                                          <p:spTgt spid="3">
+                                            <p:txEl>
+                                              <p:pRg st="0" end="0"/>
+                                            </p:txEl>
+                                          </p:spTgt>
+                                        </p:tgtEl>
+                                        <p:attrNameLst>
+                                          <p:attrName>fill.type</p:attrName>
+                                        </p:attrNameLst>
+                                      </p:cBhvr>
+                                      <p:to>
+                                        <p:strVal val="solid"/>
+                                      </p:to>
+                                    </p:set>
+                                  </p:childTnLst>
+                                </p:cTn>
+                              </p:par>
+                              <p:par>
+                                <p:cTn id="19" presetID="16" presetClass="emph" presetSubtype="0" fill="hold" nodeType="withEffect">
+                                  <p:stCondLst>
+                                    <p:cond delay="0"/>
+                                  </p:stCondLst>
+                                  <p:iterate type="lt">
+                                    <p:tmPct val="4000"/>
+                                  </p:iterate>
+                                  <p:childTnLst>
+                                    <p:set>
+                                      <p:cBhvr override="childStyle">
+                                        <p:cTn id="20" dur="500" fill="hold"/>
+                                        <p:tgtEl>
+                                          <p:spTgt spid="3">
+                                            <p:txEl>
+                                              <p:pRg st="1" end="1"/>
+                                            </p:txEl>
+                                          </p:spTgt>
+                                        </p:tgtEl>
+                                        <p:attrNameLst>
+                                          <p:attrName>style.color</p:attrName>
+                                        </p:attrNameLst>
+                                      </p:cBhvr>
+                                      <p:to>
+                                        <p:clrVal>
+                                          <a:srgbClr val="FFFFFF"/>
+                                        </p:clrVal>
+                                      </p:to>
+                                    </p:set>
+                                    <p:set>
+                                      <p:cBhvr>
+                                        <p:cTn id="21" dur="500" fill="hold"/>
+                                        <p:tgtEl>
+                                          <p:spTgt spid="3">
+                                            <p:txEl>
+                                              <p:pRg st="1" end="1"/>
+                                            </p:txEl>
+                                          </p:spTgt>
+                                        </p:tgtEl>
+                                        <p:attrNameLst>
+                                          <p:attrName>fillcolor</p:attrName>
+                                        </p:attrNameLst>
+                                      </p:cBhvr>
+                                      <p:to>
+                                        <p:clrVal>
+                                          <a:srgbClr val="FFFFFF"/>
+                                        </p:clrVal>
+                                      </p:to>
+                                    </p:set>
+                                    <p:set>
+                                      <p:cBhvr>
+                                        <p:cTn id="22" dur="500" fill="hold"/>
+                                        <p:tgtEl>
+                                          <p:spTgt spid="3">
+                                            <p:txEl>
+                                              <p:pRg st="1" end="1"/>
+                                            </p:txEl>
+                                          </p:spTgt>
+                                        </p:tgtEl>
+                                        <p:attrNameLst>
+                                          <p:attrName>fill.type</p:attrName>
+                                        </p:attrNameLst>
+                                      </p:cBhvr>
+                                      <p:to>
+                                        <p:strVal val="solid"/>
+                                      </p:to>
+                                    </p:set>
+                                  </p:childTnLst>
+                                </p:cTn>
+                              </p:par>
+                              <p:par>
+                                <p:cTn id="23" presetID="16" presetClass="emph" presetSubtype="0" fill="hold" nodeType="withEffect">
+                                  <p:stCondLst>
+                                    <p:cond delay="0"/>
+                                  </p:stCondLst>
+                                  <p:iterate type="lt">
+                                    <p:tmPct val="4000"/>
+                                  </p:iterate>
+                                  <p:childTnLst>
+                                    <p:set>
+                                      <p:cBhvr override="childStyle">
+                                        <p:cTn id="24" dur="500" fill="hold"/>
+                                        <p:tgtEl>
+                                          <p:spTgt spid="3">
+                                            <p:txEl>
+                                              <p:pRg st="2" end="2"/>
+                                            </p:txEl>
+                                          </p:spTgt>
+                                        </p:tgtEl>
+                                        <p:attrNameLst>
+                                          <p:attrName>style.color</p:attrName>
+                                        </p:attrNameLst>
+                                      </p:cBhvr>
+                                      <p:to>
+                                        <p:clrVal>
+                                          <a:schemeClr val="accent2"/>
+                                        </p:clrVal>
+                                      </p:to>
+                                    </p:set>
+                                    <p:set>
+                                      <p:cBhvr>
+                                        <p:cTn id="25" dur="500" fill="hold"/>
+                                        <p:tgtEl>
+                                          <p:spTgt spid="3">
+                                            <p:txEl>
+                                              <p:pRg st="2" end="2"/>
+                                            </p:txEl>
+                                          </p:spTgt>
+                                        </p:tgtEl>
+                                        <p:attrNameLst>
+                                          <p:attrName>fillcolor</p:attrName>
+                                        </p:attrNameLst>
+                                      </p:cBhvr>
+                                      <p:to>
+                                        <p:clrVal>
+                                          <a:schemeClr val="accent2"/>
+                                        </p:clrVal>
+                                      </p:to>
+                                    </p:set>
+                                    <p:set>
+                                      <p:cBhvr>
+                                        <p:cTn id="26" dur="500" fill="hold"/>
+                                        <p:tgtEl>
+                                          <p:spTgt spid="3">
+                                            <p:txEl>
+                                              <p:pRg st="2" end="2"/>
+                                            </p:txEl>
+                                          </p:spTgt>
+                                        </p:tgtEl>
+                                        <p:attrNameLst>
+                                          <p:attrName>fill.type</p:attrName>
+                                        </p:attrNameLst>
+                                      </p:cBhvr>
+                                      <p:to>
+                                        <p:strVal val="solid"/>
+                                      </p:to>
+                                    </p:set>
+                                  </p:childTnLst>
+                                </p:cTn>
+                              </p:par>
+                              <p:par>
+                                <p:cTn id="27" presetID="16" presetClass="emph" presetSubtype="0" fill="hold" nodeType="withEffect">
+                                  <p:stCondLst>
+                                    <p:cond delay="0"/>
+                                  </p:stCondLst>
+                                  <p:iterate type="lt">
+                                    <p:tmPct val="4000"/>
+                                  </p:iterate>
+                                  <p:childTnLst>
+                                    <p:set>
+                                      <p:cBhvr override="childStyle">
+                                        <p:cTn id="28" dur="500" fill="hold"/>
+                                        <p:tgtEl>
+                                          <p:spTgt spid="3">
+                                            <p:txEl>
+                                              <p:pRg st="3" end="3"/>
+                                            </p:txEl>
+                                          </p:spTgt>
+                                        </p:tgtEl>
+                                        <p:attrNameLst>
+                                          <p:attrName>style.color</p:attrName>
+                                        </p:attrNameLst>
+                                      </p:cBhvr>
+                                      <p:to>
+                                        <p:clrVal>
+                                          <a:schemeClr val="accent2"/>
+                                        </p:clrVal>
+                                      </p:to>
+                                    </p:set>
+                                    <p:set>
+                                      <p:cBhvr>
+                                        <p:cTn id="29" dur="500" fill="hold"/>
+                                        <p:tgtEl>
+                                          <p:spTgt spid="3">
+                                            <p:txEl>
+                                              <p:pRg st="3" end="3"/>
+                                            </p:txEl>
+                                          </p:spTgt>
+                                        </p:tgtEl>
+                                        <p:attrNameLst>
+                                          <p:attrName>fillcolor</p:attrName>
+                                        </p:attrNameLst>
+                                      </p:cBhvr>
+                                      <p:to>
+                                        <p:clrVal>
+                                          <a:schemeClr val="accent2"/>
+                                        </p:clrVal>
+                                      </p:to>
+                                    </p:set>
+                                    <p:set>
+                                      <p:cBhvr>
+                                        <p:cTn id="30" dur="500" fill="hold"/>
+                                        <p:tgtEl>
+                                          <p:spTgt spid="3">
+                                            <p:txEl>
+                                              <p:pRg st="3" end="3"/>
+                                            </p:txEl>
+                                          </p:spTgt>
+                                        </p:tgtEl>
+                                        <p:attrNameLst>
+                                          <p:attrName>fill.type</p:attrName>
+                                        </p:attrNameLst>
+                                      </p:cBhvr>
+                                      <p:to>
+                                        <p:strVal val="solid"/>
+                                      </p:to>
+                                    </p:set>
+                                  </p:childTnLst>
+                                </p:cTn>
+                              </p:par>
+                            </p:childTnLst>
+                          </p:cTn>
+                        </p:par>
+                      </p:childTnLst>
+                    </p:cTn>
+                  </p:par>
+                  <p:par>
+                    <p:cTn id="31" fill="hold">
+                      <p:stCondLst>
+                        <p:cond delay="indefinite"/>
+                      </p:stCondLst>
+                      <p:childTnLst>
+                        <p:par>
+                          <p:cTn id="32" fill="hold">
+                            <p:stCondLst>
+                              <p:cond delay="0"/>
+                            </p:stCondLst>
+                            <p:childTnLst>
+                              <p:par>
+                                <p:cTn id="33" presetID="16" presetClass="emph" presetSubtype="0" fill="hold" nodeType="clickEffect">
+                                  <p:stCondLst>
+                                    <p:cond delay="0"/>
+                                  </p:stCondLst>
+                                  <p:iterate type="lt">
+                                    <p:tmPct val="4000"/>
+                                  </p:iterate>
+                                  <p:childTnLst>
+                                    <p:set>
+                                      <p:cBhvr override="childStyle">
+                                        <p:cTn id="34" dur="500" fill="hold"/>
+                                        <p:tgtEl>
+                                          <p:spTgt spid="3">
+                                            <p:txEl>
+                                              <p:pRg st="2" end="2"/>
+                                            </p:txEl>
+                                          </p:spTgt>
+                                        </p:tgtEl>
+                                        <p:attrNameLst>
+                                          <p:attrName>style.color</p:attrName>
+                                        </p:attrNameLst>
+                                      </p:cBhvr>
+                                      <p:to>
+                                        <p:clrVal>
+                                          <a:srgbClr val="FFFFFF"/>
+                                        </p:clrVal>
+                                      </p:to>
+                                    </p:set>
+                                    <p:set>
+                                      <p:cBhvr>
+                                        <p:cTn id="35" dur="500" fill="hold"/>
+                                        <p:tgtEl>
+                                          <p:spTgt spid="3">
+                                            <p:txEl>
+                                              <p:pRg st="2" end="2"/>
+                                            </p:txEl>
+                                          </p:spTgt>
+                                        </p:tgtEl>
+                                        <p:attrNameLst>
+                                          <p:attrName>fillcolor</p:attrName>
+                                        </p:attrNameLst>
+                                      </p:cBhvr>
+                                      <p:to>
+                                        <p:clrVal>
+                                          <a:srgbClr val="FFFFFF"/>
+                                        </p:clrVal>
+                                      </p:to>
+                                    </p:set>
+                                    <p:set>
+                                      <p:cBhvr>
+                                        <p:cTn id="36" dur="500" fill="hold"/>
+                                        <p:tgtEl>
+                                          <p:spTgt spid="3">
+                                            <p:txEl>
+                                              <p:pRg st="2" end="2"/>
+                                            </p:txEl>
+                                          </p:spTgt>
+                                        </p:tgtEl>
+                                        <p:attrNameLst>
+                                          <p:attrName>fill.type</p:attrName>
+                                        </p:attrNameLst>
+                                      </p:cBhvr>
+                                      <p:to>
+                                        <p:strVal val="solid"/>
+                                      </p:to>
+                                    </p:set>
+                                  </p:childTnLst>
+                                </p:cTn>
+                              </p:par>
+                              <p:par>
+                                <p:cTn id="37" presetID="16" presetClass="emph" presetSubtype="0" fill="hold" nodeType="withEffect">
+                                  <p:stCondLst>
+                                    <p:cond delay="0"/>
+                                  </p:stCondLst>
+                                  <p:iterate type="lt">
+                                    <p:tmPct val="4000"/>
+                                  </p:iterate>
+                                  <p:childTnLst>
+                                    <p:set>
+                                      <p:cBhvr override="childStyle">
+                                        <p:cTn id="38" dur="500" fill="hold"/>
+                                        <p:tgtEl>
+                                          <p:spTgt spid="3">
+                                            <p:txEl>
+                                              <p:pRg st="3" end="3"/>
+                                            </p:txEl>
+                                          </p:spTgt>
+                                        </p:tgtEl>
+                                        <p:attrNameLst>
+                                          <p:attrName>style.color</p:attrName>
+                                        </p:attrNameLst>
+                                      </p:cBhvr>
+                                      <p:to>
+                                        <p:clrVal>
+                                          <a:srgbClr val="FFFFFF"/>
+                                        </p:clrVal>
+                                      </p:to>
+                                    </p:set>
+                                    <p:set>
+                                      <p:cBhvr>
+                                        <p:cTn id="39" dur="500" fill="hold"/>
+                                        <p:tgtEl>
+                                          <p:spTgt spid="3">
+                                            <p:txEl>
+                                              <p:pRg st="3" end="3"/>
+                                            </p:txEl>
+                                          </p:spTgt>
+                                        </p:tgtEl>
+                                        <p:attrNameLst>
+                                          <p:attrName>fillcolor</p:attrName>
+                                        </p:attrNameLst>
+                                      </p:cBhvr>
+                                      <p:to>
+                                        <p:clrVal>
+                                          <a:srgbClr val="FFFFFF"/>
+                                        </p:clrVal>
+                                      </p:to>
+                                    </p:set>
+                                    <p:set>
+                                      <p:cBhvr>
+                                        <p:cTn id="40" dur="500" fill="hold"/>
+                                        <p:tgtEl>
+                                          <p:spTgt spid="3">
+                                            <p:txEl>
+                                              <p:pRg st="3" end="3"/>
+                                            </p:txEl>
+                                          </p:spTgt>
+                                        </p:tgtEl>
+                                        <p:attrNameLst>
+                                          <p:attrName>fill.type</p:attrName>
+                                        </p:attrNameLst>
+                                      </p:cBhvr>
+                                      <p:to>
+                                        <p:strVal val="solid"/>
+                                      </p:to>
+                                    </p:set>
+                                  </p:childTnLst>
+                                </p:cTn>
+                              </p:par>
+                              <p:par>
+                                <p:cTn id="41" presetID="16" presetClass="emph" presetSubtype="0" fill="hold" nodeType="withEffect">
+                                  <p:stCondLst>
+                                    <p:cond delay="0"/>
+                                  </p:stCondLst>
+                                  <p:iterate type="lt">
+                                    <p:tmPct val="4000"/>
+                                  </p:iterate>
+                                  <p:childTnLst>
+                                    <p:set>
+                                      <p:cBhvr override="childStyle">
+                                        <p:cTn id="42" dur="500" fill="hold"/>
+                                        <p:tgtEl>
+                                          <p:spTgt spid="3">
+                                            <p:txEl>
+                                              <p:pRg st="4" end="4"/>
+                                            </p:txEl>
+                                          </p:spTgt>
+                                        </p:tgtEl>
+                                        <p:attrNameLst>
+                                          <p:attrName>style.color</p:attrName>
+                                        </p:attrNameLst>
+                                      </p:cBhvr>
+                                      <p:to>
+                                        <p:clrVal>
+                                          <a:schemeClr val="accent2"/>
+                                        </p:clrVal>
+                                      </p:to>
+                                    </p:set>
+                                    <p:set>
+                                      <p:cBhvr>
+                                        <p:cTn id="43" dur="500" fill="hold"/>
+                                        <p:tgtEl>
+                                          <p:spTgt spid="3">
+                                            <p:txEl>
+                                              <p:pRg st="4" end="4"/>
+                                            </p:txEl>
+                                          </p:spTgt>
+                                        </p:tgtEl>
+                                        <p:attrNameLst>
+                                          <p:attrName>fillcolor</p:attrName>
+                                        </p:attrNameLst>
+                                      </p:cBhvr>
+                                      <p:to>
+                                        <p:clrVal>
+                                          <a:schemeClr val="accent2"/>
+                                        </p:clrVal>
+                                      </p:to>
+                                    </p:set>
+                                    <p:set>
+                                      <p:cBhvr>
+                                        <p:cTn id="44" dur="500" fill="hold"/>
+                                        <p:tgtEl>
+                                          <p:spTgt spid="3">
+                                            <p:txEl>
+                                              <p:pRg st="4" end="4"/>
+                                            </p:txEl>
+                                          </p:spTgt>
+                                        </p:tgtEl>
+                                        <p:attrNameLst>
+                                          <p:attrName>fill.type</p:attrName>
+                                        </p:attrNameLst>
+                                      </p:cBhvr>
+                                      <p:to>
+                                        <p:strVal val="solid"/>
+                                      </p:to>
+                                    </p:set>
+                                  </p:childTnLst>
+                                </p:cTn>
+                              </p:par>
+                            </p:childTnLst>
+                          </p:cTn>
+                        </p:par>
+                      </p:childTnLst>
+                    </p:cTn>
+                  </p:par>
+                  <p:par>
+                    <p:cTn id="45" fill="hold">
+                      <p:stCondLst>
+                        <p:cond delay="indefinite"/>
+                      </p:stCondLst>
+                      <p:childTnLst>
+                        <p:par>
+                          <p:cTn id="46" fill="hold">
+                            <p:stCondLst>
+                              <p:cond delay="0"/>
+                            </p:stCondLst>
+                            <p:childTnLst>
+                              <p:par>
+                                <p:cTn id="47" presetID="16" presetClass="emph" presetSubtype="0" fill="hold" nodeType="clickEffect">
+                                  <p:stCondLst>
+                                    <p:cond delay="0"/>
+                                  </p:stCondLst>
+                                  <p:iterate type="lt">
+                                    <p:tmPct val="4000"/>
+                                  </p:iterate>
+                                  <p:childTnLst>
+                                    <p:set>
+                                      <p:cBhvr override="childStyle">
+                                        <p:cTn id="48" dur="500" fill="hold"/>
+                                        <p:tgtEl>
+                                          <p:spTgt spid="3">
+                                            <p:txEl>
+                                              <p:pRg st="4" end="4"/>
+                                            </p:txEl>
+                                          </p:spTgt>
+                                        </p:tgtEl>
+                                        <p:attrNameLst>
+                                          <p:attrName>style.color</p:attrName>
+                                        </p:attrNameLst>
+                                      </p:cBhvr>
+                                      <p:to>
+                                        <p:clrVal>
+                                          <a:srgbClr val="FFFFFF"/>
+                                        </p:clrVal>
+                                      </p:to>
+                                    </p:set>
+                                    <p:set>
+                                      <p:cBhvr>
+                                        <p:cTn id="49" dur="500" fill="hold"/>
+                                        <p:tgtEl>
+                                          <p:spTgt spid="3">
+                                            <p:txEl>
+                                              <p:pRg st="4" end="4"/>
+                                            </p:txEl>
+                                          </p:spTgt>
+                                        </p:tgtEl>
+                                        <p:attrNameLst>
+                                          <p:attrName>fillcolor</p:attrName>
+                                        </p:attrNameLst>
+                                      </p:cBhvr>
+                                      <p:to>
+                                        <p:clrVal>
+                                          <a:srgbClr val="FFFFFF"/>
+                                        </p:clrVal>
+                                      </p:to>
+                                    </p:set>
+                                    <p:set>
+                                      <p:cBhvr>
+                                        <p:cTn id="50" dur="500" fill="hold"/>
+                                        <p:tgtEl>
+                                          <p:spTgt spid="3">
+                                            <p:txEl>
+                                              <p:pRg st="4" end="4"/>
+                                            </p:txEl>
+                                          </p:spTgt>
+                                        </p:tgtEl>
+                                        <p:attrNameLst>
+                                          <p:attrName>fill.type</p:attrName>
+                                        </p:attrNameLst>
+                                      </p:cBhvr>
+                                      <p:to>
+                                        <p:strVal val="solid"/>
+                                      </p:to>
+                                    </p:set>
+                                  </p:childTnLst>
+                                </p:cTn>
+                              </p:par>
+                              <p:par>
+                                <p:cTn id="51" presetID="16" presetClass="emph" presetSubtype="0" fill="hold" nodeType="withEffect">
+                                  <p:stCondLst>
+                                    <p:cond delay="0"/>
+                                  </p:stCondLst>
+                                  <p:iterate type="lt">
+                                    <p:tmPct val="4000"/>
+                                  </p:iterate>
+                                  <p:childTnLst>
+                                    <p:set>
+                                      <p:cBhvr override="childStyle">
+                                        <p:cTn id="52" dur="500" fill="hold"/>
+                                        <p:tgtEl>
+                                          <p:spTgt spid="3">
+                                            <p:txEl>
+                                              <p:pRg st="5" end="5"/>
+                                            </p:txEl>
+                                          </p:spTgt>
+                                        </p:tgtEl>
+                                        <p:attrNameLst>
+                                          <p:attrName>style.color</p:attrName>
+                                        </p:attrNameLst>
+                                      </p:cBhvr>
+                                      <p:to>
+                                        <p:clrVal>
+                                          <a:schemeClr val="accent2"/>
+                                        </p:clrVal>
+                                      </p:to>
+                                    </p:set>
+                                    <p:set>
+                                      <p:cBhvr>
+                                        <p:cTn id="53" dur="500" fill="hold"/>
+                                        <p:tgtEl>
+                                          <p:spTgt spid="3">
+                                            <p:txEl>
+                                              <p:pRg st="5" end="5"/>
+                                            </p:txEl>
+                                          </p:spTgt>
+                                        </p:tgtEl>
+                                        <p:attrNameLst>
+                                          <p:attrName>fillcolor</p:attrName>
+                                        </p:attrNameLst>
+                                      </p:cBhvr>
+                                      <p:to>
+                                        <p:clrVal>
+                                          <a:schemeClr val="accent2"/>
+                                        </p:clrVal>
+                                      </p:to>
+                                    </p:set>
+                                    <p:set>
+                                      <p:cBhvr>
+                                        <p:cTn id="54" dur="500" fill="hold"/>
+                                        <p:tgtEl>
+                                          <p:spTgt spid="3">
+                                            <p:txEl>
+                                              <p:pRg st="5" end="5"/>
+                                            </p:txEl>
+                                          </p:spTgt>
+                                        </p:tgtEl>
+                                        <p:attrNameLst>
+                                          <p:attrName>fill.type</p:attrName>
+                                        </p:attrNameLst>
+                                      </p:cBhvr>
+                                      <p:to>
+                                        <p:strVal val="solid"/>
+                                      </p:to>
+                                    </p:set>
+                                  </p:childTnLst>
+                                </p:cTn>
+                              </p:par>
+                              <p:par>
+                                <p:cTn id="55" presetID="16" presetClass="emph" presetSubtype="0" fill="hold" nodeType="withEffect">
+                                  <p:stCondLst>
+                                    <p:cond delay="0"/>
+                                  </p:stCondLst>
+                                  <p:iterate type="lt">
+                                    <p:tmPct val="4000"/>
+                                  </p:iterate>
+                                  <p:childTnLst>
+                                    <p:set>
+                                      <p:cBhvr override="childStyle">
+                                        <p:cTn id="56" dur="500" fill="hold"/>
+                                        <p:tgtEl>
+                                          <p:spTgt spid="3">
+                                            <p:txEl>
+                                              <p:pRg st="6" end="6"/>
+                                            </p:txEl>
+                                          </p:spTgt>
+                                        </p:tgtEl>
+                                        <p:attrNameLst>
+                                          <p:attrName>style.color</p:attrName>
+                                        </p:attrNameLst>
+                                      </p:cBhvr>
+                                      <p:to>
+                                        <p:clrVal>
+                                          <a:schemeClr val="accent2"/>
+                                        </p:clrVal>
+                                      </p:to>
+                                    </p:set>
+                                    <p:set>
+                                      <p:cBhvr>
+                                        <p:cTn id="57" dur="500" fill="hold"/>
+                                        <p:tgtEl>
+                                          <p:spTgt spid="3">
+                                            <p:txEl>
+                                              <p:pRg st="6" end="6"/>
+                                            </p:txEl>
+                                          </p:spTgt>
+                                        </p:tgtEl>
+                                        <p:attrNameLst>
+                                          <p:attrName>fillcolor</p:attrName>
+                                        </p:attrNameLst>
+                                      </p:cBhvr>
+                                      <p:to>
+                                        <p:clrVal>
+                                          <a:schemeClr val="accent2"/>
+                                        </p:clrVal>
+                                      </p:to>
+                                    </p:set>
+                                    <p:set>
+                                      <p:cBhvr>
+                                        <p:cTn id="58" dur="500" fill="hold"/>
+                                        <p:tgtEl>
+                                          <p:spTgt spid="3">
+                                            <p:txEl>
+                                              <p:pRg st="6" end="6"/>
+                                            </p:txEl>
+                                          </p:spTgt>
+                                        </p:tgtEl>
+                                        <p:attrNameLst>
+                                          <p:attrName>fill.type</p:attrName>
+                                        </p:attrNameLst>
+                                      </p:cBhvr>
+                                      <p:to>
+                                        <p:strVal val="solid"/>
+                                      </p:to>
+                                    </p:set>
+                                  </p:childTnLst>
+                                </p:cTn>
+                              </p:par>
+                            </p:childTnLst>
+                          </p:cTn>
+                        </p:par>
+                      </p:childTnLst>
+                    </p:cTn>
+                  </p:par>
+                  <p:par>
+                    <p:cTn id="59" fill="hold">
+                      <p:stCondLst>
+                        <p:cond delay="indefinite"/>
+                      </p:stCondLst>
+                      <p:childTnLst>
+                        <p:par>
+                          <p:cTn id="60" fill="hold">
+                            <p:stCondLst>
+                              <p:cond delay="0"/>
+                            </p:stCondLst>
+                            <p:childTnLst>
+                              <p:par>
+                                <p:cTn id="61" presetID="16" presetClass="emph" presetSubtype="0" fill="hold" nodeType="clickEffect">
+                                  <p:stCondLst>
+                                    <p:cond delay="0"/>
+                                  </p:stCondLst>
+                                  <p:iterate type="lt">
+                                    <p:tmPct val="4000"/>
+                                  </p:iterate>
+                                  <p:childTnLst>
+                                    <p:set>
+                                      <p:cBhvr override="childStyle">
+                                        <p:cTn id="62" dur="500" fill="hold"/>
+                                        <p:tgtEl>
+                                          <p:spTgt spid="3">
+                                            <p:txEl>
+                                              <p:pRg st="5" end="5"/>
+                                            </p:txEl>
+                                          </p:spTgt>
+                                        </p:tgtEl>
+                                        <p:attrNameLst>
+                                          <p:attrName>style.color</p:attrName>
+                                        </p:attrNameLst>
+                                      </p:cBhvr>
+                                      <p:to>
+                                        <p:clrVal>
+                                          <a:srgbClr val="FFFFFF"/>
+                                        </p:clrVal>
+                                      </p:to>
+                                    </p:set>
+                                    <p:set>
+                                      <p:cBhvr>
+                                        <p:cTn id="63" dur="500" fill="hold"/>
+                                        <p:tgtEl>
+                                          <p:spTgt spid="3">
+                                            <p:txEl>
+                                              <p:pRg st="5" end="5"/>
+                                            </p:txEl>
+                                          </p:spTgt>
+                                        </p:tgtEl>
+                                        <p:attrNameLst>
+                                          <p:attrName>fillcolor</p:attrName>
+                                        </p:attrNameLst>
+                                      </p:cBhvr>
+                                      <p:to>
+                                        <p:clrVal>
+                                          <a:srgbClr val="FFFFFF"/>
+                                        </p:clrVal>
+                                      </p:to>
+                                    </p:set>
+                                    <p:set>
+                                      <p:cBhvr>
+                                        <p:cTn id="64" dur="500" fill="hold"/>
+                                        <p:tgtEl>
+                                          <p:spTgt spid="3">
+                                            <p:txEl>
+                                              <p:pRg st="5" end="5"/>
+                                            </p:txEl>
+                                          </p:spTgt>
+                                        </p:tgtEl>
+                                        <p:attrNameLst>
+                                          <p:attrName>fill.type</p:attrName>
+                                        </p:attrNameLst>
+                                      </p:cBhvr>
+                                      <p:to>
+                                        <p:strVal val="solid"/>
+                                      </p:to>
+                                    </p:set>
+                                  </p:childTnLst>
+                                </p:cTn>
+                              </p:par>
+                              <p:par>
+                                <p:cTn id="65" presetID="16" presetClass="emph" presetSubtype="0" fill="hold" nodeType="withEffect">
+                                  <p:stCondLst>
+                                    <p:cond delay="0"/>
+                                  </p:stCondLst>
+                                  <p:iterate type="lt">
+                                    <p:tmPct val="4000"/>
+                                  </p:iterate>
+                                  <p:childTnLst>
+                                    <p:set>
+                                      <p:cBhvr override="childStyle">
+                                        <p:cTn id="66" dur="500" fill="hold"/>
+                                        <p:tgtEl>
+                                          <p:spTgt spid="3">
+                                            <p:txEl>
+                                              <p:pRg st="6" end="6"/>
+                                            </p:txEl>
+                                          </p:spTgt>
+                                        </p:tgtEl>
+                                        <p:attrNameLst>
+                                          <p:attrName>style.color</p:attrName>
+                                        </p:attrNameLst>
+                                      </p:cBhvr>
+                                      <p:to>
+                                        <p:clrVal>
+                                          <a:srgbClr val="FFFFFF"/>
+                                        </p:clrVal>
+                                      </p:to>
+                                    </p:set>
+                                    <p:set>
+                                      <p:cBhvr>
+                                        <p:cTn id="67" dur="500" fill="hold"/>
+                                        <p:tgtEl>
+                                          <p:spTgt spid="3">
+                                            <p:txEl>
+                                              <p:pRg st="6" end="6"/>
+                                            </p:txEl>
+                                          </p:spTgt>
+                                        </p:tgtEl>
+                                        <p:attrNameLst>
+                                          <p:attrName>fillcolor</p:attrName>
+                                        </p:attrNameLst>
+                                      </p:cBhvr>
+                                      <p:to>
+                                        <p:clrVal>
+                                          <a:srgbClr val="FFFFFF"/>
+                                        </p:clrVal>
+                                      </p:to>
+                                    </p:set>
+                                    <p:set>
+                                      <p:cBhvr>
+                                        <p:cTn id="68" dur="500" fill="hold"/>
+                                        <p:tgtEl>
+                                          <p:spTgt spid="3">
+                                            <p:txEl>
+                                              <p:pRg st="6" end="6"/>
+                                            </p:txEl>
+                                          </p:spTgt>
+                                        </p:tgtEl>
+                                        <p:attrNameLst>
+                                          <p:attrName>fill.type</p:attrName>
+                                        </p:attrNameLst>
+                                      </p:cBhvr>
+                                      <p:to>
+                                        <p:strVal val="solid"/>
+                                      </p:to>
+                                    </p:set>
+                                  </p:childTnLst>
+                                </p:cTn>
+                              </p:par>
+                              <p:par>
+                                <p:cTn id="69" presetID="16" presetClass="emph" presetSubtype="0" fill="hold" nodeType="withEffect">
+                                  <p:stCondLst>
+                                    <p:cond delay="0"/>
+                                  </p:stCondLst>
+                                  <p:iterate type="lt">
+                                    <p:tmPct val="4000"/>
+                                  </p:iterate>
+                                  <p:childTnLst>
+                                    <p:set>
+                                      <p:cBhvr override="childStyle">
+                                        <p:cTn id="70" dur="500" fill="hold"/>
+                                        <p:tgtEl>
+                                          <p:spTgt spid="3">
+                                            <p:txEl>
+                                              <p:pRg st="7" end="7"/>
+                                            </p:txEl>
+                                          </p:spTgt>
+                                        </p:tgtEl>
+                                        <p:attrNameLst>
+                                          <p:attrName>style.color</p:attrName>
+                                        </p:attrNameLst>
+                                      </p:cBhvr>
+                                      <p:to>
+                                        <p:clrVal>
+                                          <a:schemeClr val="accent2"/>
+                                        </p:clrVal>
+                                      </p:to>
+                                    </p:set>
+                                    <p:set>
+                                      <p:cBhvr>
+                                        <p:cTn id="71" dur="500" fill="hold"/>
+                                        <p:tgtEl>
+                                          <p:spTgt spid="3">
+                                            <p:txEl>
+                                              <p:pRg st="7" end="7"/>
+                                            </p:txEl>
+                                          </p:spTgt>
+                                        </p:tgtEl>
+                                        <p:attrNameLst>
+                                          <p:attrName>fillcolor</p:attrName>
+                                        </p:attrNameLst>
+                                      </p:cBhvr>
+                                      <p:to>
+                                        <p:clrVal>
+                                          <a:schemeClr val="accent2"/>
+                                        </p:clrVal>
+                                      </p:to>
+                                    </p:set>
+                                    <p:set>
+                                      <p:cBhvr>
+                                        <p:cTn id="72" dur="500" fill="hold"/>
+                                        <p:tgtEl>
+                                          <p:spTgt spid="3">
+                                            <p:txEl>
+                                              <p:pRg st="7" end="7"/>
+                                            </p:txEl>
+                                          </p:spTgt>
+                                        </p:tgtEl>
+                                        <p:attrNameLst>
+                                          <p:attrName>fill.type</p:attrName>
+                                        </p:attrNameLst>
+                                      </p:cBhvr>
+                                      <p:to>
+                                        <p:strVal val="solid"/>
+                                      </p:to>
+                                    </p:set>
+                                  </p:childTnLst>
+                                </p:cTn>
+                              </p:par>
+                              <p:par>
+                                <p:cTn id="73" presetID="16" presetClass="emph" presetSubtype="0" fill="hold" nodeType="withEffect">
+                                  <p:stCondLst>
+                                    <p:cond delay="0"/>
+                                  </p:stCondLst>
+                                  <p:iterate type="lt">
+                                    <p:tmPct val="4000"/>
+                                  </p:iterate>
+                                  <p:childTnLst>
+                                    <p:set>
+                                      <p:cBhvr override="childStyle">
+                                        <p:cTn id="74" dur="500" fill="hold"/>
+                                        <p:tgtEl>
+                                          <p:spTgt spid="3">
+                                            <p:txEl>
+                                              <p:pRg st="8" end="8"/>
+                                            </p:txEl>
+                                          </p:spTgt>
+                                        </p:tgtEl>
+                                        <p:attrNameLst>
+                                          <p:attrName>style.color</p:attrName>
+                                        </p:attrNameLst>
+                                      </p:cBhvr>
+                                      <p:to>
+                                        <p:clrVal>
+                                          <a:schemeClr val="accent2"/>
+                                        </p:clrVal>
+                                      </p:to>
+                                    </p:set>
+                                    <p:set>
+                                      <p:cBhvr>
+                                        <p:cTn id="75" dur="500" fill="hold"/>
+                                        <p:tgtEl>
+                                          <p:spTgt spid="3">
+                                            <p:txEl>
+                                              <p:pRg st="8" end="8"/>
+                                            </p:txEl>
+                                          </p:spTgt>
+                                        </p:tgtEl>
+                                        <p:attrNameLst>
+                                          <p:attrName>fillcolor</p:attrName>
+                                        </p:attrNameLst>
+                                      </p:cBhvr>
+                                      <p:to>
+                                        <p:clrVal>
+                                          <a:schemeClr val="accent2"/>
+                                        </p:clrVal>
+                                      </p:to>
+                                    </p:set>
+                                    <p:set>
+                                      <p:cBhvr>
+                                        <p:cTn id="76" dur="500" fill="hold"/>
+                                        <p:tgtEl>
+                                          <p:spTgt spid="3">
+                                            <p:txEl>
+                                              <p:pRg st="8" end="8"/>
+                                            </p:txEl>
+                                          </p:spTgt>
+                                        </p:tgtEl>
+                                        <p:attrNameLst>
+                                          <p:attrName>fill.type</p:attrName>
+                                        </p:attrNameLst>
+                                      </p:cBhvr>
+                                      <p:to>
+                                        <p:strVal val="solid"/>
+                                      </p:to>
+                                    </p:set>
+                                  </p:childTnLst>
+                                </p:cTn>
+                              </p:par>
+                              <p:par>
+                                <p:cTn id="77" presetID="16" presetClass="emph" presetSubtype="0" fill="hold" nodeType="withEffect">
+                                  <p:stCondLst>
+                                    <p:cond delay="0"/>
+                                  </p:stCondLst>
+                                  <p:iterate type="lt">
+                                    <p:tmPct val="4000"/>
+                                  </p:iterate>
+                                  <p:childTnLst>
+                                    <p:set>
+                                      <p:cBhvr override="childStyle">
+                                        <p:cTn id="78" dur="500" fill="hold"/>
+                                        <p:tgtEl>
+                                          <p:spTgt spid="3">
+                                            <p:txEl>
+                                              <p:pRg st="9" end="9"/>
+                                            </p:txEl>
+                                          </p:spTgt>
+                                        </p:tgtEl>
+                                        <p:attrNameLst>
+                                          <p:attrName>style.color</p:attrName>
+                                        </p:attrNameLst>
+                                      </p:cBhvr>
+                                      <p:to>
+                                        <p:clrVal>
+                                          <a:schemeClr val="accent2"/>
+                                        </p:clrVal>
+                                      </p:to>
+                                    </p:set>
+                                    <p:set>
+                                      <p:cBhvr>
+                                        <p:cTn id="79" dur="500" fill="hold"/>
+                                        <p:tgtEl>
+                                          <p:spTgt spid="3">
+                                            <p:txEl>
+                                              <p:pRg st="9" end="9"/>
+                                            </p:txEl>
+                                          </p:spTgt>
+                                        </p:tgtEl>
+                                        <p:attrNameLst>
+                                          <p:attrName>fillcolor</p:attrName>
+                                        </p:attrNameLst>
+                                      </p:cBhvr>
+                                      <p:to>
+                                        <p:clrVal>
+                                          <a:schemeClr val="accent2"/>
+                                        </p:clrVal>
+                                      </p:to>
+                                    </p:set>
+                                    <p:set>
+                                      <p:cBhvr>
+                                        <p:cTn id="80" dur="500" fill="hold"/>
+                                        <p:tgtEl>
+                                          <p:spTgt spid="3">
+                                            <p:txEl>
+                                              <p:pRg st="9" end="9"/>
+                                            </p:txEl>
+                                          </p:spTgt>
+                                        </p:tgtEl>
+                                        <p:attrNameLst>
+                                          <p:attrName>fill.type</p:attrName>
+                                        </p:attrNameLst>
+                                      </p:cBhvr>
+                                      <p:to>
+                                        <p:strVal val="solid"/>
+                                      </p:to>
+                                    </p:set>
+                                  </p:childTnLst>
+                                </p:cTn>
+                              </p:par>
+                            </p:childTnLst>
+                          </p:cTn>
+                        </p:par>
+                      </p:childTnLst>
+                    </p:cTn>
+                  </p:par>
+                  <p:par>
+                    <p:cTn id="81" fill="hold">
+                      <p:stCondLst>
+                        <p:cond delay="indefinite"/>
+                      </p:stCondLst>
+                      <p:childTnLst>
+                        <p:par>
+                          <p:cTn id="82" fill="hold">
+                            <p:stCondLst>
+                              <p:cond delay="0"/>
+                            </p:stCondLst>
+                            <p:childTnLst>
+                              <p:par>
+                                <p:cTn id="83" presetID="16" presetClass="emph" presetSubtype="0" fill="hold" nodeType="clickEffect">
+                                  <p:stCondLst>
+                                    <p:cond delay="0"/>
+                                  </p:stCondLst>
+                                  <p:iterate type="lt">
+                                    <p:tmPct val="4000"/>
+                                  </p:iterate>
+                                  <p:childTnLst>
+                                    <p:set>
+                                      <p:cBhvr override="childStyle">
+                                        <p:cTn id="84" dur="500" fill="hold"/>
+                                        <p:tgtEl>
+                                          <p:spTgt spid="3">
+                                            <p:txEl>
+                                              <p:pRg st="7" end="7"/>
+                                            </p:txEl>
+                                          </p:spTgt>
+                                        </p:tgtEl>
+                                        <p:attrNameLst>
+                                          <p:attrName>style.color</p:attrName>
+                                        </p:attrNameLst>
+                                      </p:cBhvr>
+                                      <p:to>
+                                        <p:clrVal>
+                                          <a:srgbClr val="FFFFFF"/>
+                                        </p:clrVal>
+                                      </p:to>
+                                    </p:set>
+                                    <p:set>
+                                      <p:cBhvr>
+                                        <p:cTn id="85" dur="500" fill="hold"/>
+                                        <p:tgtEl>
+                                          <p:spTgt spid="3">
+                                            <p:txEl>
+                                              <p:pRg st="7" end="7"/>
+                                            </p:txEl>
+                                          </p:spTgt>
+                                        </p:tgtEl>
+                                        <p:attrNameLst>
+                                          <p:attrName>fillcolor</p:attrName>
+                                        </p:attrNameLst>
+                                      </p:cBhvr>
+                                      <p:to>
+                                        <p:clrVal>
+                                          <a:srgbClr val="FFFFFF"/>
+                                        </p:clrVal>
+                                      </p:to>
+                                    </p:set>
+                                    <p:set>
+                                      <p:cBhvr>
+                                        <p:cTn id="86" dur="500" fill="hold"/>
+                                        <p:tgtEl>
+                                          <p:spTgt spid="3">
+                                            <p:txEl>
+                                              <p:pRg st="7" end="7"/>
+                                            </p:txEl>
+                                          </p:spTgt>
+                                        </p:tgtEl>
+                                        <p:attrNameLst>
+                                          <p:attrName>fill.type</p:attrName>
+                                        </p:attrNameLst>
+                                      </p:cBhvr>
+                                      <p:to>
+                                        <p:strVal val="solid"/>
+                                      </p:to>
+                                    </p:set>
+                                  </p:childTnLst>
+                                </p:cTn>
+                              </p:par>
+                              <p:par>
+                                <p:cTn id="87" presetID="16" presetClass="emph" presetSubtype="0" fill="hold" nodeType="withEffect">
+                                  <p:stCondLst>
+                                    <p:cond delay="0"/>
+                                  </p:stCondLst>
+                                  <p:iterate type="lt">
+                                    <p:tmPct val="4000"/>
+                                  </p:iterate>
+                                  <p:childTnLst>
+                                    <p:set>
+                                      <p:cBhvr override="childStyle">
+                                        <p:cTn id="88" dur="500" fill="hold"/>
+                                        <p:tgtEl>
+                                          <p:spTgt spid="3">
+                                            <p:txEl>
+                                              <p:pRg st="8" end="8"/>
+                                            </p:txEl>
+                                          </p:spTgt>
+                                        </p:tgtEl>
+                                        <p:attrNameLst>
+                                          <p:attrName>style.color</p:attrName>
+                                        </p:attrNameLst>
+                                      </p:cBhvr>
+                                      <p:to>
+                                        <p:clrVal>
+                                          <a:srgbClr val="FFFFFF"/>
+                                        </p:clrVal>
+                                      </p:to>
+                                    </p:set>
+                                    <p:set>
+                                      <p:cBhvr>
+                                        <p:cTn id="89" dur="500" fill="hold"/>
+                                        <p:tgtEl>
+                                          <p:spTgt spid="3">
+                                            <p:txEl>
+                                              <p:pRg st="8" end="8"/>
+                                            </p:txEl>
+                                          </p:spTgt>
+                                        </p:tgtEl>
+                                        <p:attrNameLst>
+                                          <p:attrName>fillcolor</p:attrName>
+                                        </p:attrNameLst>
+                                      </p:cBhvr>
+                                      <p:to>
+                                        <p:clrVal>
+                                          <a:srgbClr val="FFFFFF"/>
+                                        </p:clrVal>
+                                      </p:to>
+                                    </p:set>
+                                    <p:set>
+                                      <p:cBhvr>
+                                        <p:cTn id="90" dur="500" fill="hold"/>
+                                        <p:tgtEl>
+                                          <p:spTgt spid="3">
+                                            <p:txEl>
+                                              <p:pRg st="8" end="8"/>
+                                            </p:txEl>
+                                          </p:spTgt>
+                                        </p:tgtEl>
+                                        <p:attrNameLst>
+                                          <p:attrName>fill.type</p:attrName>
+                                        </p:attrNameLst>
+                                      </p:cBhvr>
+                                      <p:to>
+                                        <p:strVal val="solid"/>
+                                      </p:to>
+                                    </p:set>
+                                  </p:childTnLst>
+                                </p:cTn>
+                              </p:par>
+                              <p:par>
+                                <p:cTn id="91" presetID="16" presetClass="emph" presetSubtype="0" fill="hold" nodeType="withEffect">
+                                  <p:stCondLst>
+                                    <p:cond delay="0"/>
+                                  </p:stCondLst>
+                                  <p:iterate type="lt">
+                                    <p:tmPct val="4000"/>
+                                  </p:iterate>
+                                  <p:childTnLst>
+                                    <p:set>
+                                      <p:cBhvr override="childStyle">
+                                        <p:cTn id="92" dur="500" fill="hold"/>
+                                        <p:tgtEl>
+                                          <p:spTgt spid="3">
+                                            <p:txEl>
+                                              <p:pRg st="9" end="9"/>
+                                            </p:txEl>
+                                          </p:spTgt>
+                                        </p:tgtEl>
+                                        <p:attrNameLst>
+                                          <p:attrName>style.color</p:attrName>
+                                        </p:attrNameLst>
+                                      </p:cBhvr>
+                                      <p:to>
+                                        <p:clrVal>
+                                          <a:srgbClr val="FFFFFF"/>
+                                        </p:clrVal>
+                                      </p:to>
+                                    </p:set>
+                                    <p:set>
+                                      <p:cBhvr>
+                                        <p:cTn id="93" dur="500" fill="hold"/>
+                                        <p:tgtEl>
+                                          <p:spTgt spid="3">
+                                            <p:txEl>
+                                              <p:pRg st="9" end="9"/>
+                                            </p:txEl>
+                                          </p:spTgt>
+                                        </p:tgtEl>
+                                        <p:attrNameLst>
+                                          <p:attrName>fillcolor</p:attrName>
+                                        </p:attrNameLst>
+                                      </p:cBhvr>
+                                      <p:to>
+                                        <p:clrVal>
+                                          <a:srgbClr val="FFFFFF"/>
+                                        </p:clrVal>
+                                      </p:to>
+                                    </p:set>
+                                    <p:set>
+                                      <p:cBhvr>
+                                        <p:cTn id="94" dur="500" fill="hold"/>
+                                        <p:tgtEl>
+                                          <p:spTgt spid="3">
+                                            <p:txEl>
+                                              <p:pRg st="9" end="9"/>
+                                            </p:txEl>
+                                          </p:spTgt>
+                                        </p:tgtEl>
+                                        <p:attrNameLst>
+                                          <p:attrName>fill.type</p:attrName>
+                                        </p:attrNameLst>
+                                      </p:cBhvr>
+                                      <p:to>
+                                        <p:strVal val="solid"/>
+                                      </p:to>
+                                    </p:set>
+                                  </p:childTnLst>
+                                </p:cTn>
+                              </p:par>
+                              <p:par>
+                                <p:cTn id="95" presetID="16" presetClass="emph" presetSubtype="0" fill="hold" nodeType="withEffect">
+                                  <p:stCondLst>
+                                    <p:cond delay="0"/>
+                                  </p:stCondLst>
+                                  <p:iterate type="lt">
+                                    <p:tmPct val="4000"/>
+                                  </p:iterate>
+                                  <p:childTnLst>
+                                    <p:set>
+                                      <p:cBhvr override="childStyle">
+                                        <p:cTn id="96" dur="500" fill="hold"/>
+                                        <p:tgtEl>
+                                          <p:spTgt spid="3">
+                                            <p:txEl>
+                                              <p:pRg st="10" end="10"/>
+                                            </p:txEl>
+                                          </p:spTgt>
+                                        </p:tgtEl>
+                                        <p:attrNameLst>
+                                          <p:attrName>style.color</p:attrName>
+                                        </p:attrNameLst>
+                                      </p:cBhvr>
+                                      <p:to>
+                                        <p:clrVal>
+                                          <a:schemeClr val="accent2"/>
+                                        </p:clrVal>
+                                      </p:to>
+                                    </p:set>
+                                    <p:set>
+                                      <p:cBhvr>
+                                        <p:cTn id="97" dur="500" fill="hold"/>
+                                        <p:tgtEl>
+                                          <p:spTgt spid="3">
+                                            <p:txEl>
+                                              <p:pRg st="10" end="10"/>
+                                            </p:txEl>
+                                          </p:spTgt>
+                                        </p:tgtEl>
+                                        <p:attrNameLst>
+                                          <p:attrName>fillcolor</p:attrName>
+                                        </p:attrNameLst>
+                                      </p:cBhvr>
+                                      <p:to>
+                                        <p:clrVal>
+                                          <a:schemeClr val="accent2"/>
+                                        </p:clrVal>
+                                      </p:to>
+                                    </p:set>
+                                    <p:set>
+                                      <p:cBhvr>
+                                        <p:cTn id="98" dur="500" fill="hold"/>
+                                        <p:tgtEl>
+                                          <p:spTgt spid="3">
+                                            <p:txEl>
+                                              <p:pRg st="10" end="10"/>
+                                            </p:txEl>
+                                          </p:spTgt>
+                                        </p:tgtEl>
+                                        <p:attrNameLst>
+                                          <p:attrName>fill.type</p:attrName>
+                                        </p:attrNameLst>
+                                      </p:cBhvr>
+                                      <p:to>
+                                        <p:strVal val="solid"/>
+                                      </p:to>
+                                    </p:set>
+                                  </p:childTnLst>
+                                </p:cTn>
+                              </p:par>
+                              <p:par>
+                                <p:cTn id="99" presetID="16" presetClass="emph" presetSubtype="0" fill="hold" nodeType="withEffect">
+                                  <p:stCondLst>
+                                    <p:cond delay="0"/>
+                                  </p:stCondLst>
+                                  <p:iterate type="lt">
+                                    <p:tmPct val="4000"/>
+                                  </p:iterate>
+                                  <p:childTnLst>
+                                    <p:set>
+                                      <p:cBhvr override="childStyle">
+                                        <p:cTn id="100" dur="500" fill="hold"/>
+                                        <p:tgtEl>
+                                          <p:spTgt spid="3">
+                                            <p:txEl>
+                                              <p:pRg st="11" end="11"/>
+                                            </p:txEl>
+                                          </p:spTgt>
+                                        </p:tgtEl>
+                                        <p:attrNameLst>
+                                          <p:attrName>style.color</p:attrName>
+                                        </p:attrNameLst>
+                                      </p:cBhvr>
+                                      <p:to>
+                                        <p:clrVal>
+                                          <a:schemeClr val="accent2"/>
+                                        </p:clrVal>
+                                      </p:to>
+                                    </p:set>
+                                    <p:set>
+                                      <p:cBhvr>
+                                        <p:cTn id="101" dur="500" fill="hold"/>
+                                        <p:tgtEl>
+                                          <p:spTgt spid="3">
+                                            <p:txEl>
+                                              <p:pRg st="11" end="11"/>
+                                            </p:txEl>
+                                          </p:spTgt>
+                                        </p:tgtEl>
+                                        <p:attrNameLst>
+                                          <p:attrName>fillcolor</p:attrName>
+                                        </p:attrNameLst>
+                                      </p:cBhvr>
+                                      <p:to>
+                                        <p:clrVal>
+                                          <a:schemeClr val="accent2"/>
+                                        </p:clrVal>
+                                      </p:to>
+                                    </p:set>
+                                    <p:set>
+                                      <p:cBhvr>
+                                        <p:cTn id="102" dur="500" fill="hold"/>
+                                        <p:tgtEl>
+                                          <p:spTgt spid="3">
+                                            <p:txEl>
+                                              <p:pRg st="11" end="11"/>
+                                            </p:txEl>
+                                          </p:spTgt>
+                                        </p:tgtEl>
+                                        <p:attrNameLst>
+                                          <p:attrName>fill.type</p:attrName>
+                                        </p:attrNameLst>
+                                      </p:cBhvr>
+                                      <p:to>
+                                        <p:strVal val="solid"/>
+                                      </p:to>
+                                    </p:set>
+                                  </p:childTnLst>
+                                </p:cTn>
+                              </p:par>
+                            </p:childTnLst>
+                          </p:cTn>
+                        </p:par>
+                      </p:childTnLst>
+                    </p:cTn>
+                  </p:par>
+                </p:childTnLst>
+              </p:cTn>
+              <p:prevCondLst>
+                <p:cond evt="onPrev" delay="0">
+                  <p:tgtEl>
+                    <p:sldTgt/>
+                  </p:tgtEl>
+                </p:cond>
+              </p:prevCondLst>
+              <p:nextCondLst>
+                <p:cond evt="onNext" delay="0">
+                  <p:tgtEl>
+                    <p:sldTgt/>
+                  </p:tgtEl>
+                </p:cond>
+              </p:nextCondLst>
+            </p:seq>
+          </p:childTnLst>
+        </p:cTn>
       </p:par>
     </p:tnLst>
   </p:timing>
@@ -9588,8 +11259,8 @@
           </a:p>
         </p:txBody>
       </p:sp>
-      <mc:AlternateContent xmlns:mc="http://schemas.openxmlformats.org/markup-compatibility/2006">
-        <mc:Choice xmlns:a14="http://schemas.microsoft.com/office/drawing/2010/main" Requires="a14">
+      <mc:AlternateContent xmlns:mc="http://schemas.openxmlformats.org/markup-compatibility/2006" xmlns:a14="http://schemas.microsoft.com/office/drawing/2010/main">
+        <mc:Choice Requires="a14">
           <p:sp>
             <p:nvSpPr>
               <p:cNvPr id="3" name="Espace réservé du contenu 2"/>
@@ -9808,7 +11479,7 @@
             </p:txBody>
           </p:sp>
         </mc:Choice>
-        <mc:Fallback>
+        <mc:Fallback xmlns="">
           <p:sp>
             <p:nvSpPr>
               <p:cNvPr id="3" name="Espace réservé du contenu 2"/>
@@ -12171,7 +13842,213 @@
   <p:timing>
     <p:tnLst>
       <p:par>
-        <p:cTn id="1" dur="indefinite" restart="never" nodeType="tmRoot"/>
+        <p:cTn id="1" dur="indefinite" restart="never" nodeType="tmRoot">
+          <p:childTnLst>
+            <p:seq concurrent="1" nextAc="seek">
+              <p:cTn id="2" dur="indefinite" nodeType="mainSeq">
+                <p:childTnLst>
+                  <p:par>
+                    <p:cTn id="3" fill="hold">
+                      <p:stCondLst>
+                        <p:cond delay="indefinite"/>
+                      </p:stCondLst>
+                      <p:childTnLst>
+                        <p:par>
+                          <p:cTn id="4" fill="hold">
+                            <p:stCondLst>
+                              <p:cond delay="0"/>
+                            </p:stCondLst>
+                            <p:childTnLst>
+                              <p:par>
+                                <p:cTn id="5" presetID="10" presetClass="entr" presetSubtype="0" fill="hold" nodeType="clickEffect">
+                                  <p:stCondLst>
+                                    <p:cond delay="0"/>
+                                  </p:stCondLst>
+                                  <p:childTnLst>
+                                    <p:set>
+                                      <p:cBhvr>
+                                        <p:cTn id="6" dur="1" fill="hold">
+                                          <p:stCondLst>
+                                            <p:cond delay="0"/>
+                                          </p:stCondLst>
+                                        </p:cTn>
+                                        <p:tgtEl>
+                                          <p:spTgt spid="3">
+                                            <p:txEl>
+                                              <p:pRg st="0" end="0"/>
+                                            </p:txEl>
+                                          </p:spTgt>
+                                        </p:tgtEl>
+                                        <p:attrNameLst>
+                                          <p:attrName>style.visibility</p:attrName>
+                                        </p:attrNameLst>
+                                      </p:cBhvr>
+                                      <p:to>
+                                        <p:strVal val="visible"/>
+                                      </p:to>
+                                    </p:set>
+                                    <p:animEffect transition="in" filter="fade">
+                                      <p:cBhvr>
+                                        <p:cTn id="7" dur="500"/>
+                                        <p:tgtEl>
+                                          <p:spTgt spid="3">
+                                            <p:txEl>
+                                              <p:pRg st="0" end="0"/>
+                                            </p:txEl>
+                                          </p:spTgt>
+                                        </p:tgtEl>
+                                      </p:cBhvr>
+                                    </p:animEffect>
+                                  </p:childTnLst>
+                                </p:cTn>
+                              </p:par>
+                            </p:childTnLst>
+                          </p:cTn>
+                        </p:par>
+                      </p:childTnLst>
+                    </p:cTn>
+                  </p:par>
+                  <p:par>
+                    <p:cTn id="8" fill="hold">
+                      <p:stCondLst>
+                        <p:cond delay="indefinite"/>
+                      </p:stCondLst>
+                      <p:childTnLst>
+                        <p:par>
+                          <p:cTn id="9" fill="hold">
+                            <p:stCondLst>
+                              <p:cond delay="0"/>
+                            </p:stCondLst>
+                            <p:childTnLst>
+                              <p:par>
+                                <p:cTn id="10" presetID="10" presetClass="entr" presetSubtype="0" fill="hold" nodeType="clickEffect">
+                                  <p:stCondLst>
+                                    <p:cond delay="0"/>
+                                  </p:stCondLst>
+                                  <p:childTnLst>
+                                    <p:set>
+                                      <p:cBhvr>
+                                        <p:cTn id="11" dur="1" fill="hold">
+                                          <p:stCondLst>
+                                            <p:cond delay="0"/>
+                                          </p:stCondLst>
+                                        </p:cTn>
+                                        <p:tgtEl>
+                                          <p:spTgt spid="3">
+                                            <p:txEl>
+                                              <p:pRg st="1" end="1"/>
+                                            </p:txEl>
+                                          </p:spTgt>
+                                        </p:tgtEl>
+                                        <p:attrNameLst>
+                                          <p:attrName>style.visibility</p:attrName>
+                                        </p:attrNameLst>
+                                      </p:cBhvr>
+                                      <p:to>
+                                        <p:strVal val="visible"/>
+                                      </p:to>
+                                    </p:set>
+                                    <p:animEffect transition="in" filter="fade">
+                                      <p:cBhvr>
+                                        <p:cTn id="12" dur="500"/>
+                                        <p:tgtEl>
+                                          <p:spTgt spid="3">
+                                            <p:txEl>
+                                              <p:pRg st="1" end="1"/>
+                                            </p:txEl>
+                                          </p:spTgt>
+                                        </p:tgtEl>
+                                      </p:cBhvr>
+                                    </p:animEffect>
+                                  </p:childTnLst>
+                                </p:cTn>
+                              </p:par>
+                            </p:childTnLst>
+                          </p:cTn>
+                        </p:par>
+                      </p:childTnLst>
+                    </p:cTn>
+                  </p:par>
+                  <p:par>
+                    <p:cTn id="13" fill="hold">
+                      <p:stCondLst>
+                        <p:cond delay="indefinite"/>
+                      </p:stCondLst>
+                      <p:childTnLst>
+                        <p:par>
+                          <p:cTn id="14" fill="hold">
+                            <p:stCondLst>
+                              <p:cond delay="0"/>
+                            </p:stCondLst>
+                            <p:childTnLst>
+                              <p:par>
+                                <p:cTn id="15" presetID="10" presetClass="entr" presetSubtype="0" fill="hold" nodeType="clickEffect">
+                                  <p:stCondLst>
+                                    <p:cond delay="0"/>
+                                  </p:stCondLst>
+                                  <p:childTnLst>
+                                    <p:set>
+                                      <p:cBhvr>
+                                        <p:cTn id="16" dur="1" fill="hold">
+                                          <p:stCondLst>
+                                            <p:cond delay="0"/>
+                                          </p:stCondLst>
+                                        </p:cTn>
+                                        <p:tgtEl>
+                                          <p:spTgt spid="3">
+                                            <p:txEl>
+                                              <p:pRg st="2" end="2"/>
+                                            </p:txEl>
+                                          </p:spTgt>
+                                        </p:tgtEl>
+                                        <p:attrNameLst>
+                                          <p:attrName>style.visibility</p:attrName>
+                                        </p:attrNameLst>
+                                      </p:cBhvr>
+                                      <p:to>
+                                        <p:strVal val="visible"/>
+                                      </p:to>
+                                    </p:set>
+                                    <p:animEffect transition="in" filter="fade">
+                                      <p:cBhvr>
+                                        <p:cTn id="17" dur="500"/>
+                                        <p:tgtEl>
+                                          <p:spTgt spid="3">
+                                            <p:txEl>
+                                              <p:pRg st="2" end="2"/>
+                                            </p:txEl>
+                                          </p:spTgt>
+                                        </p:tgtEl>
+                                      </p:cBhvr>
+                                    </p:animEffect>
+                                  </p:childTnLst>
+                                </p:cTn>
+                              </p:par>
+                            </p:childTnLst>
+                          </p:cTn>
+                        </p:par>
+                      </p:childTnLst>
+                    </p:cTn>
+                  </p:par>
+                </p:childTnLst>
+              </p:cTn>
+              <p:prevCondLst>
+                <p:cond evt="onPrev" delay="0">
+                  <p:tgtEl>
+                    <p:sldTgt/>
+                  </p:tgtEl>
+                </p:cond>
+              </p:prevCondLst>
+              <p:nextCondLst>
+                <p:cond evt="onNext" delay="0">
+                  <p:tgtEl>
+                    <p:sldTgt/>
+                  </p:tgtEl>
+                </p:cond>
+              </p:nextCondLst>
+            </p:seq>
+          </p:childTnLst>
+        </p:cTn>
       </p:par>
     </p:tnLst>
   </p:timing>
@@ -12372,6 +14249,9 @@
                     <p:cTn id="3" fill="hold">
                       <p:stCondLst>
                         <p:cond delay="indefinite"/>
+                        <p:cond evt="onBegin" delay="0">
+                          <p:tn val="2"/>
+                        </p:cond>
                       </p:stCondLst>
                       <p:childTnLst>
                         <p:par>
@@ -12381,7 +14261,7 @@
                             </p:stCondLst>
                             <p:childTnLst>
                               <p:par>
-                                <p:cTn id="5" presetID="10" presetClass="entr" presetSubtype="0" fill="hold" grpId="0" nodeType="clickEffect">
+                                <p:cTn id="5" presetID="10" presetClass="entr" presetSubtype="0" fill="hold" grpId="0" nodeType="withEffect">
                                   <p:stCondLst>
                                     <p:cond delay="0"/>
                                   </p:stCondLst>
@@ -12598,30 +14478,21 @@
                             </p:childTnLst>
                           </p:cTn>
                         </p:par>
-                      </p:childTnLst>
-                    </p:cTn>
-                  </p:par>
-                  <p:par>
-                    <p:cTn id="20" fill="hold">
-                      <p:stCondLst>
-                        <p:cond delay="indefinite"/>
-                      </p:stCondLst>
-                      <p:childTnLst>
                         <p:par>
-                          <p:cTn id="21" fill="hold">
+                          <p:cTn id="20" fill="hold">
                             <p:stCondLst>
-                              <p:cond delay="0"/>
+                              <p:cond delay="500"/>
                             </p:stCondLst>
                             <p:childTnLst>
                               <p:par>
-                                <p:cTn id="22" presetID="10" presetClass="entr" presetSubtype="0" fill="hold" grpId="0" nodeType="clickEffect">
+                                <p:cTn id="21" presetID="10" presetClass="entr" presetSubtype="0" fill="hold" grpId="0" nodeType="afterEffect">
                                   <p:stCondLst>
                                     <p:cond delay="0"/>
                                   </p:stCondLst>
                                   <p:childTnLst>
                                     <p:set>
                                       <p:cBhvr>
-                                        <p:cTn id="23" dur="1" fill="hold">
+                                        <p:cTn id="22" dur="1" fill="hold">
                                           <p:stCondLst>
                                             <p:cond delay="0"/>
                                           </p:stCondLst>
@@ -12643,7 +14514,7 @@
                                     </p:set>
                                     <p:animEffect transition="in" filter="fade">
                                       <p:cBhvr>
-                                        <p:cTn id="24" dur="500"/>
+                                        <p:cTn id="23" dur="500"/>
                                         <p:tgtEl>
                                           <p:spTgt spid="3">
                                             <p:txEl>
@@ -12657,14 +14528,14 @@
                                 </p:cTn>
                               </p:par>
                               <p:par>
-                                <p:cTn id="25" presetID="10" presetClass="entr" presetSubtype="0" fill="hold" grpId="0" nodeType="withEffect">
+                                <p:cTn id="24" presetID="10" presetClass="entr" presetSubtype="0" fill="hold" grpId="0" nodeType="withEffect">
                                   <p:stCondLst>
                                     <p:cond delay="0"/>
                                   </p:stCondLst>
                                   <p:childTnLst>
                                     <p:set>
                                       <p:cBhvr>
-                                        <p:cTn id="26" dur="1" fill="hold">
+                                        <p:cTn id="25" dur="1" fill="hold">
                                           <p:stCondLst>
                                             <p:cond delay="0"/>
                                           </p:stCondLst>
@@ -12686,7 +14557,7 @@
                                     </p:set>
                                     <p:animEffect transition="in" filter="fade">
                                       <p:cBhvr>
-                                        <p:cTn id="27" dur="500"/>
+                                        <p:cTn id="26" dur="500"/>
                                         <p:tgtEl>
                                           <p:spTgt spid="3">
                                             <p:txEl>
@@ -12700,14 +14571,14 @@
                                 </p:cTn>
                               </p:par>
                               <p:par>
-                                <p:cTn id="28" presetID="10" presetClass="entr" presetSubtype="0" fill="hold" grpId="0" nodeType="withEffect">
+                                <p:cTn id="27" presetID="10" presetClass="entr" presetSubtype="0" fill="hold" grpId="0" nodeType="withEffect">
                                   <p:stCondLst>
                                     <p:cond delay="0"/>
                                   </p:stCondLst>
                                   <p:childTnLst>
                                     <p:set>
                                       <p:cBhvr>
-                                        <p:cTn id="29" dur="1" fill="hold">
+                                        <p:cTn id="28" dur="1" fill="hold">
                                           <p:stCondLst>
                                             <p:cond delay="0"/>
                                           </p:stCondLst>
@@ -12729,7 +14600,7 @@
                                     </p:set>
                                     <p:animEffect transition="in" filter="fade">
                                       <p:cBhvr>
-                                        <p:cTn id="30" dur="500"/>
+                                        <p:cTn id="29" dur="500"/>
                                         <p:tgtEl>
                                           <p:spTgt spid="3">
                                             <p:txEl>
@@ -12743,14 +14614,14 @@
                                 </p:cTn>
                               </p:par>
                               <p:par>
-                                <p:cTn id="31" presetID="10" presetClass="entr" presetSubtype="0" fill="hold" grpId="0" nodeType="withEffect">
+                                <p:cTn id="30" presetID="10" presetClass="entr" presetSubtype="0" fill="hold" grpId="0" nodeType="withEffect">
                                   <p:stCondLst>
                                     <p:cond delay="0"/>
                                   </p:stCondLst>
                                   <p:childTnLst>
                                     <p:set>
                                       <p:cBhvr>
-                                        <p:cTn id="32" dur="1" fill="hold">
+                                        <p:cTn id="31" dur="1" fill="hold">
                                           <p:stCondLst>
                                             <p:cond delay="0"/>
                                           </p:stCondLst>
@@ -12772,7 +14643,7 @@
                                     </p:set>
                                     <p:animEffect transition="in" filter="fade">
                                       <p:cBhvr>
-                                        <p:cTn id="33" dur="500"/>
+                                        <p:cTn id="32" dur="500"/>
                                         <p:tgtEl>
                                           <p:spTgt spid="3">
                                             <p:txEl>
@@ -12786,14 +14657,14 @@
                                 </p:cTn>
                               </p:par>
                               <p:par>
-                                <p:cTn id="34" presetID="10" presetClass="entr" presetSubtype="0" fill="hold" grpId="0" nodeType="withEffect">
+                                <p:cTn id="33" presetID="10" presetClass="entr" presetSubtype="0" fill="hold" grpId="0" nodeType="withEffect">
                                   <p:stCondLst>
                                     <p:cond delay="0"/>
                                   </p:stCondLst>
                                   <p:childTnLst>
                                     <p:set>
                                       <p:cBhvr>
-                                        <p:cTn id="35" dur="1" fill="hold">
+                                        <p:cTn id="34" dur="1" fill="hold">
                                           <p:stCondLst>
                                             <p:cond delay="0"/>
                                           </p:stCondLst>
@@ -12815,7 +14686,7 @@
                                     </p:set>
                                     <p:animEffect transition="in" filter="fade">
                                       <p:cBhvr>
-                                        <p:cTn id="36" dur="500"/>
+                                        <p:cTn id="35" dur="500"/>
                                         <p:tgtEl>
                                           <p:spTgt spid="3">
                                             <p:txEl>
@@ -12831,30 +14702,21 @@
                             </p:childTnLst>
                           </p:cTn>
                         </p:par>
-                      </p:childTnLst>
-                    </p:cTn>
-                  </p:par>
-                  <p:par>
-                    <p:cTn id="37" fill="hold">
-                      <p:stCondLst>
-                        <p:cond delay="indefinite"/>
-                      </p:stCondLst>
-                      <p:childTnLst>
                         <p:par>
-                          <p:cTn id="38" fill="hold">
+                          <p:cTn id="36" fill="hold">
                             <p:stCondLst>
-                              <p:cond delay="0"/>
+                              <p:cond delay="1000"/>
                             </p:stCondLst>
                             <p:childTnLst>
                               <p:par>
-                                <p:cTn id="39" presetID="10" presetClass="entr" presetSubtype="0" fill="hold" grpId="0" nodeType="clickEffect">
+                                <p:cTn id="37" presetID="10" presetClass="entr" presetSubtype="0" fill="hold" grpId="0" nodeType="afterEffect">
                                   <p:stCondLst>
                                     <p:cond delay="0"/>
                                   </p:stCondLst>
                                   <p:childTnLst>
                                     <p:set>
                                       <p:cBhvr>
-                                        <p:cTn id="40" dur="1" fill="hold">
+                                        <p:cTn id="38" dur="1" fill="hold">
                                           <p:stCondLst>
                                             <p:cond delay="0"/>
                                           </p:stCondLst>
@@ -12876,7 +14738,7 @@
                                     </p:set>
                                     <p:animEffect transition="in" filter="fade">
                                       <p:cBhvr>
-                                        <p:cTn id="41" dur="500"/>
+                                        <p:cTn id="39" dur="500"/>
                                         <p:tgtEl>
                                           <p:spTgt spid="3">
                                             <p:txEl>
@@ -12892,30 +14754,21 @@
                             </p:childTnLst>
                           </p:cTn>
                         </p:par>
-                      </p:childTnLst>
-                    </p:cTn>
-                  </p:par>
-                  <p:par>
-                    <p:cTn id="42" fill="hold">
-                      <p:stCondLst>
-                        <p:cond delay="indefinite"/>
-                      </p:stCondLst>
-                      <p:childTnLst>
                         <p:par>
-                          <p:cTn id="43" fill="hold">
+                          <p:cTn id="40" fill="hold">
                             <p:stCondLst>
-                              <p:cond delay="0"/>
+                              <p:cond delay="1500"/>
                             </p:stCondLst>
                             <p:childTnLst>
                               <p:par>
-                                <p:cTn id="44" presetID="10" presetClass="entr" presetSubtype="0" fill="hold" grpId="0" nodeType="clickEffect">
+                                <p:cTn id="41" presetID="10" presetClass="entr" presetSubtype="0" fill="hold" grpId="0" nodeType="afterEffect">
                                   <p:stCondLst>
                                     <p:cond delay="0"/>
                                   </p:stCondLst>
                                   <p:childTnLst>
                                     <p:set>
                                       <p:cBhvr>
-                                        <p:cTn id="45" dur="1" fill="hold">
+                                        <p:cTn id="42" dur="1" fill="hold">
                                           <p:stCondLst>
                                             <p:cond delay="0"/>
                                           </p:stCondLst>
@@ -12937,7 +14790,7 @@
                                     </p:set>
                                     <p:animEffect transition="in" filter="fade">
                                       <p:cBhvr>
-                                        <p:cTn id="46" dur="500"/>
+                                        <p:cTn id="43" dur="500"/>
                                         <p:tgtEl>
                                           <p:spTgt spid="3">
                                             <p:txEl>
@@ -12978,7 +14831,7 @@
       </p:par>
     </p:tnLst>
     <p:bldLst>
-      <p:bldP spid="3" grpId="0" build="p"/>
+      <p:bldP spid="3" grpId="0" uiExpand="1" build="p"/>
     </p:bldLst>
   </p:timing>
 </p:sld>
@@ -13105,6 +14958,9 @@
                     <p:cTn id="3" fill="hold">
                       <p:stCondLst>
                         <p:cond delay="indefinite"/>
+                        <p:cond evt="onBegin" delay="0">
+                          <p:tn val="2"/>
+                        </p:cond>
                       </p:stCondLst>
                       <p:childTnLst>
                         <p:par>
@@ -13114,7 +14970,7 @@
                             </p:stCondLst>
                             <p:childTnLst>
                               <p:par>
-                                <p:cTn id="5" presetID="10" presetClass="entr" presetSubtype="0" fill="hold" grpId="0" nodeType="clickEffect">
+                                <p:cTn id="5" presetID="10" presetClass="entr" presetSubtype="0" fill="hold" grpId="0" nodeType="withEffect">
                                   <p:stCondLst>
                                     <p:cond delay="0"/>
                                   </p:stCondLst>
@@ -13159,30 +15015,21 @@
                             </p:childTnLst>
                           </p:cTn>
                         </p:par>
-                      </p:childTnLst>
-                    </p:cTn>
-                  </p:par>
-                  <p:par>
-                    <p:cTn id="8" fill="hold">
-                      <p:stCondLst>
-                        <p:cond delay="indefinite"/>
-                      </p:stCondLst>
-                      <p:childTnLst>
                         <p:par>
-                          <p:cTn id="9" fill="hold">
+                          <p:cTn id="8" fill="hold">
                             <p:stCondLst>
-                              <p:cond delay="0"/>
+                              <p:cond delay="500"/>
                             </p:stCondLst>
                             <p:childTnLst>
                               <p:par>
-                                <p:cTn id="10" presetID="10" presetClass="entr" presetSubtype="0" fill="hold" grpId="0" nodeType="clickEffect">
+                                <p:cTn id="9" presetID="10" presetClass="entr" presetSubtype="0" fill="hold" grpId="0" nodeType="afterEffect">
                                   <p:stCondLst>
                                     <p:cond delay="0"/>
                                   </p:stCondLst>
                                   <p:childTnLst>
                                     <p:set>
                                       <p:cBhvr>
-                                        <p:cTn id="11" dur="1" fill="hold">
+                                        <p:cTn id="10" dur="1" fill="hold">
                                           <p:stCondLst>
                                             <p:cond delay="0"/>
                                           </p:stCondLst>
@@ -13204,7 +15051,7 @@
                                     </p:set>
                                     <p:animEffect transition="in" filter="fade">
                                       <p:cBhvr>
-                                        <p:cTn id="12" dur="500"/>
+                                        <p:cTn id="11" dur="500"/>
                                         <p:tgtEl>
                                           <p:spTgt spid="3">
                                             <p:txEl>
@@ -13674,8 +15521,8 @@
           </a:p>
         </p:txBody>
       </p:sp>
-      <mc:AlternateContent xmlns:mc="http://schemas.openxmlformats.org/markup-compatibility/2006">
-        <mc:Choice xmlns:a14="http://schemas.microsoft.com/office/drawing/2010/main" Requires="a14">
+      <mc:AlternateContent xmlns:mc="http://schemas.openxmlformats.org/markup-compatibility/2006" xmlns:a14="http://schemas.microsoft.com/office/drawing/2010/main">
+        <mc:Choice Requires="a14">
           <p:sp>
             <p:nvSpPr>
               <p:cNvPr id="6" name="ZoneTexte 5"/>
@@ -13761,7 +15608,7 @@
                     <m:d>
                       <m:dPr>
                         <m:ctrlPr>
-                          <a:rPr lang="fr-FR" sz="2800" b="0" i="0" smtClean="0">
+                          <a:rPr lang="fr-FR" sz="2800" b="0" i="1" smtClean="0">
                             <a:latin typeface="Cambria Math"/>
                           </a:rPr>
                         </m:ctrlPr>
@@ -13805,7 +15652,7 @@
             </p:txBody>
           </p:sp>
         </mc:Choice>
-        <mc:Fallback>
+        <mc:Fallback xmlns="">
           <p:sp>
             <p:nvSpPr>
               <p:cNvPr id="6" name="ZoneTexte 5"/>
@@ -14000,7 +15847,7 @@
             </p:nvSpPr>
             <p:spPr>
               <a:xfrm>
-                <a:off x="1597853" y="6163964"/>
+                <a:off x="1593835" y="6101203"/>
                 <a:ext cx="5948295" cy="581891"/>
               </a:xfrm>
               <a:prstGeom prst="rect">
@@ -14104,7 +15951,7 @@
             </p:nvSpPr>
             <p:spPr>
               <a:xfrm>
-                <a:off x="1597853" y="6163964"/>
+                <a:off x="1593835" y="6101203"/>
                 <a:ext cx="5948295" cy="581891"/>
               </a:xfrm>
               <a:prstGeom prst="rect">
@@ -14113,7 +15960,7 @@
               <a:blipFill rotWithShape="1">
                 <a:blip r:embed="rId3"/>
                 <a:stretch>
-                  <a:fillRect l="-2049" t="-1042" b="-27083"/>
+                  <a:fillRect l="-2049" t="-1053" b="-28421"/>
                 </a:stretch>
               </a:blipFill>
             </p:spPr>
@@ -14205,33 +16052,15 @@
                                   </p:childTnLst>
                                 </p:cTn>
                               </p:par>
-                            </p:childTnLst>
-                          </p:cTn>
-                        </p:par>
-                      </p:childTnLst>
-                    </p:cTn>
-                  </p:par>
-                  <p:par>
-                    <p:cTn id="8" fill="hold">
-                      <p:stCondLst>
-                        <p:cond delay="indefinite"/>
-                      </p:stCondLst>
-                      <p:childTnLst>
-                        <p:par>
-                          <p:cTn id="9" fill="hold">
-                            <p:stCondLst>
-                              <p:cond delay="0"/>
-                            </p:stCondLst>
-                            <p:childTnLst>
                               <p:par>
-                                <p:cTn id="10" presetID="10" presetClass="entr" presetSubtype="0" fill="hold" grpId="0" nodeType="clickEffect">
+                                <p:cTn id="8" presetID="10" presetClass="entr" presetSubtype="0" fill="hold" grpId="0" nodeType="withEffect">
                                   <p:stCondLst>
                                     <p:cond delay="0"/>
                                   </p:stCondLst>
                                   <p:childTnLst>
                                     <p:set>
                                       <p:cBhvr>
-                                        <p:cTn id="11" dur="1" fill="hold">
+                                        <p:cTn id="9" dur="1" fill="hold">
                                           <p:stCondLst>
                                             <p:cond delay="0"/>
                                           </p:stCondLst>
@@ -14253,11 +16082,219 @@
                                     </p:set>
                                     <p:animEffect transition="in" filter="fade">
                                       <p:cBhvr>
-                                        <p:cTn id="12" dur="500"/>
+                                        <p:cTn id="10" dur="500"/>
                                         <p:tgtEl>
                                           <p:spTgt spid="3">
                                             <p:txEl>
                                               <p:pRg st="1" end="1"/>
+                                            </p:txEl>
+                                          </p:spTgt>
+                                        </p:tgtEl>
+                                      </p:cBhvr>
+                                    </p:animEffect>
+                                  </p:childTnLst>
+                                </p:cTn>
+                              </p:par>
+                            </p:childTnLst>
+                          </p:cTn>
+                        </p:par>
+                        <p:par>
+                          <p:cTn id="11" fill="hold">
+                            <p:stCondLst>
+                              <p:cond delay="500"/>
+                            </p:stCondLst>
+                            <p:childTnLst>
+                              <p:par>
+                                <p:cTn id="12" presetID="10" presetClass="entr" presetSubtype="0" fill="hold" grpId="0" nodeType="afterEffect">
+                                  <p:stCondLst>
+                                    <p:cond delay="0"/>
+                                  </p:stCondLst>
+                                  <p:childTnLst>
+                                    <p:set>
+                                      <p:cBhvr>
+                                        <p:cTn id="13" dur="1" fill="hold">
+                                          <p:stCondLst>
+                                            <p:cond delay="0"/>
+                                          </p:stCondLst>
+                                        </p:cTn>
+                                        <p:tgtEl>
+                                          <p:spTgt spid="3">
+                                            <p:txEl>
+                                              <p:pRg st="2" end="2"/>
+                                            </p:txEl>
+                                          </p:spTgt>
+                                        </p:tgtEl>
+                                        <p:attrNameLst>
+                                          <p:attrName>style.visibility</p:attrName>
+                                        </p:attrNameLst>
+                                      </p:cBhvr>
+                                      <p:to>
+                                        <p:strVal val="visible"/>
+                                      </p:to>
+                                    </p:set>
+                                    <p:animEffect transition="in" filter="fade">
+                                      <p:cBhvr>
+                                        <p:cTn id="14" dur="500"/>
+                                        <p:tgtEl>
+                                          <p:spTgt spid="3">
+                                            <p:txEl>
+                                              <p:pRg st="2" end="2"/>
+                                            </p:txEl>
+                                          </p:spTgt>
+                                        </p:tgtEl>
+                                      </p:cBhvr>
+                                    </p:animEffect>
+                                  </p:childTnLst>
+                                </p:cTn>
+                              </p:par>
+                            </p:childTnLst>
+                          </p:cTn>
+                        </p:par>
+                        <p:par>
+                          <p:cTn id="15" fill="hold">
+                            <p:stCondLst>
+                              <p:cond delay="1000"/>
+                            </p:stCondLst>
+                            <p:childTnLst>
+                              <p:par>
+                                <p:cTn id="16" presetID="10" presetClass="entr" presetSubtype="0" fill="hold" grpId="0" nodeType="afterEffect">
+                                  <p:stCondLst>
+                                    <p:cond delay="0"/>
+                                  </p:stCondLst>
+                                  <p:childTnLst>
+                                    <p:set>
+                                      <p:cBhvr>
+                                        <p:cTn id="17" dur="1" fill="hold">
+                                          <p:stCondLst>
+                                            <p:cond delay="0"/>
+                                          </p:stCondLst>
+                                        </p:cTn>
+                                        <p:tgtEl>
+                                          <p:spTgt spid="3">
+                                            <p:txEl>
+                                              <p:pRg st="3" end="3"/>
+                                            </p:txEl>
+                                          </p:spTgt>
+                                        </p:tgtEl>
+                                        <p:attrNameLst>
+                                          <p:attrName>style.visibility</p:attrName>
+                                        </p:attrNameLst>
+                                      </p:cBhvr>
+                                      <p:to>
+                                        <p:strVal val="visible"/>
+                                      </p:to>
+                                    </p:set>
+                                    <p:animEffect transition="in" filter="fade">
+                                      <p:cBhvr>
+                                        <p:cTn id="18" dur="500"/>
+                                        <p:tgtEl>
+                                          <p:spTgt spid="3">
+                                            <p:txEl>
+                                              <p:pRg st="3" end="3"/>
+                                            </p:txEl>
+                                          </p:spTgt>
+                                        </p:tgtEl>
+                                      </p:cBhvr>
+                                    </p:animEffect>
+                                  </p:childTnLst>
+                                </p:cTn>
+                              </p:par>
+                            </p:childTnLst>
+                          </p:cTn>
+                        </p:par>
+                        <p:par>
+                          <p:cTn id="19" fill="hold">
+                            <p:stCondLst>
+                              <p:cond delay="1500"/>
+                            </p:stCondLst>
+                            <p:childTnLst>
+                              <p:par>
+                                <p:cTn id="20" presetID="10" presetClass="entr" presetSubtype="0" fill="hold" grpId="0" nodeType="afterEffect">
+                                  <p:stCondLst>
+                                    <p:cond delay="0"/>
+                                  </p:stCondLst>
+                                  <p:childTnLst>
+                                    <p:set>
+                                      <p:cBhvr>
+                                        <p:cTn id="21" dur="1" fill="hold">
+                                          <p:stCondLst>
+                                            <p:cond delay="0"/>
+                                          </p:stCondLst>
+                                        </p:cTn>
+                                        <p:tgtEl>
+                                          <p:spTgt spid="3">
+                                            <p:txEl>
+                                              <p:pRg st="4" end="4"/>
+                                            </p:txEl>
+                                          </p:spTgt>
+                                        </p:tgtEl>
+                                        <p:attrNameLst>
+                                          <p:attrName>style.visibility</p:attrName>
+                                        </p:attrNameLst>
+                                      </p:cBhvr>
+                                      <p:to>
+                                        <p:strVal val="visible"/>
+                                      </p:to>
+                                    </p:set>
+                                    <p:animEffect transition="in" filter="fade">
+                                      <p:cBhvr>
+                                        <p:cTn id="22" dur="500"/>
+                                        <p:tgtEl>
+                                          <p:spTgt spid="3">
+                                            <p:txEl>
+                                              <p:pRg st="4" end="4"/>
+                                            </p:txEl>
+                                          </p:spTgt>
+                                        </p:tgtEl>
+                                      </p:cBhvr>
+                                    </p:animEffect>
+                                  </p:childTnLst>
+                                </p:cTn>
+                              </p:par>
+                            </p:childTnLst>
+                          </p:cTn>
+                        </p:par>
+                        <p:par>
+                          <p:cTn id="23" fill="hold">
+                            <p:stCondLst>
+                              <p:cond delay="2000"/>
+                            </p:stCondLst>
+                            <p:childTnLst>
+                              <p:par>
+                                <p:cTn id="24" presetID="10" presetClass="entr" presetSubtype="0" fill="hold" grpId="0" nodeType="afterEffect">
+                                  <p:stCondLst>
+                                    <p:cond delay="0"/>
+                                  </p:stCondLst>
+                                  <p:childTnLst>
+                                    <p:set>
+                                      <p:cBhvr>
+                                        <p:cTn id="25" dur="1" fill="hold">
+                                          <p:stCondLst>
+                                            <p:cond delay="0"/>
+                                          </p:stCondLst>
+                                        </p:cTn>
+                                        <p:tgtEl>
+                                          <p:spTgt spid="3">
+                                            <p:txEl>
+                                              <p:pRg st="5" end="5"/>
+                                            </p:txEl>
+                                          </p:spTgt>
+                                        </p:tgtEl>
+                                        <p:attrNameLst>
+                                          <p:attrName>style.visibility</p:attrName>
+                                        </p:attrNameLst>
+                                      </p:cBhvr>
+                                      <p:to>
+                                        <p:strVal val="visible"/>
+                                      </p:to>
+                                    </p:set>
+                                    <p:animEffect transition="in" filter="fade">
+                                      <p:cBhvr>
+                                        <p:cTn id="26" dur="500"/>
+                                        <p:tgtEl>
+                                          <p:spTgt spid="3">
+                                            <p:txEl>
+                                              <p:pRg st="5" end="5"/>
                                             </p:txEl>
                                           </p:spTgt>
                                         </p:tgtEl>
@@ -14273,36 +16310,32 @@
                     </p:cTn>
                   </p:par>
                   <p:par>
-                    <p:cTn id="13" fill="hold">
+                    <p:cTn id="27" fill="hold">
                       <p:stCondLst>
                         <p:cond delay="indefinite"/>
                       </p:stCondLst>
                       <p:childTnLst>
                         <p:par>
-                          <p:cTn id="14" fill="hold">
+                          <p:cTn id="28" fill="hold">
                             <p:stCondLst>
                               <p:cond delay="0"/>
                             </p:stCondLst>
                             <p:childTnLst>
                               <p:par>
-                                <p:cTn id="15" presetID="10" presetClass="entr" presetSubtype="0" fill="hold" grpId="0" nodeType="clickEffect">
+                                <p:cTn id="29" presetID="10" presetClass="entr" presetSubtype="0" fill="hold" grpId="0" nodeType="clickEffect">
                                   <p:stCondLst>
                                     <p:cond delay="0"/>
                                   </p:stCondLst>
                                   <p:childTnLst>
                                     <p:set>
                                       <p:cBhvr>
-                                        <p:cTn id="16" dur="1" fill="hold">
+                                        <p:cTn id="30" dur="1" fill="hold">
                                           <p:stCondLst>
                                             <p:cond delay="0"/>
                                           </p:stCondLst>
                                         </p:cTn>
                                         <p:tgtEl>
-                                          <p:spTgt spid="3">
-                                            <p:txEl>
-                                              <p:pRg st="2" end="2"/>
-                                            </p:txEl>
-                                          </p:spTgt>
+                                          <p:spTgt spid="7"/>
                                         </p:tgtEl>
                                         <p:attrNameLst>
                                           <p:attrName>style.visibility</p:attrName>
@@ -14314,13 +16347,44 @@
                                     </p:set>
                                     <p:animEffect transition="in" filter="fade">
                                       <p:cBhvr>
-                                        <p:cTn id="17" dur="500"/>
-                                        <p:tgtEl>
-                                          <p:spTgt spid="3">
-                                            <p:txEl>
-                                              <p:pRg st="2" end="2"/>
-                                            </p:txEl>
-                                          </p:spTgt>
+                                        <p:cTn id="31" dur="500"/>
+                                        <p:tgtEl>
+                                          <p:spTgt spid="7"/>
+                                        </p:tgtEl>
+                                      </p:cBhvr>
+                                    </p:animEffect>
+                                  </p:childTnLst>
+                                </p:cTn>
+                              </p:par>
+                              <p:par>
+                                <p:cTn id="32" presetID="10" presetClass="entr" presetSubtype="0" fill="hold" grpId="0" nodeType="withEffect">
+                                  <p:stCondLst>
+                                    <p:cond delay="0"/>
+                                  </p:stCondLst>
+                                  <p:childTnLst>
+                                    <p:set>
+                                      <p:cBhvr>
+                                        <p:cTn id="33" dur="1" fill="hold">
+                                          <p:stCondLst>
+                                            <p:cond delay="0"/>
+                                          </p:stCondLst>
+                                        </p:cTn>
+                                        <p:tgtEl>
+                                          <p:spTgt spid="9"/>
+                                        </p:tgtEl>
+                                        <p:attrNameLst>
+                                          <p:attrName>style.visibility</p:attrName>
+                                        </p:attrNameLst>
+                                      </p:cBhvr>
+                                      <p:to>
+                                        <p:strVal val="visible"/>
+                                      </p:to>
+                                    </p:set>
+                                    <p:animEffect transition="in" filter="fade">
+                                      <p:cBhvr>
+                                        <p:cTn id="34" dur="500"/>
+                                        <p:tgtEl>
+                                          <p:spTgt spid="9"/>
                                         </p:tgtEl>
                                       </p:cBhvr>
                                     </p:animEffect>
@@ -14334,36 +16398,32 @@
                     </p:cTn>
                   </p:par>
                   <p:par>
-                    <p:cTn id="18" fill="hold">
+                    <p:cTn id="35" fill="hold">
                       <p:stCondLst>
                         <p:cond delay="indefinite"/>
                       </p:stCondLst>
                       <p:childTnLst>
                         <p:par>
-                          <p:cTn id="19" fill="hold">
+                          <p:cTn id="36" fill="hold">
                             <p:stCondLst>
                               <p:cond delay="0"/>
                             </p:stCondLst>
                             <p:childTnLst>
                               <p:par>
-                                <p:cTn id="20" presetID="10" presetClass="entr" presetSubtype="0" fill="hold" grpId="0" nodeType="clickEffect">
+                                <p:cTn id="37" presetID="10" presetClass="entr" presetSubtype="0" fill="hold" grpId="0" nodeType="clickEffect">
                                   <p:stCondLst>
                                     <p:cond delay="0"/>
                                   </p:stCondLst>
                                   <p:childTnLst>
                                     <p:set>
                                       <p:cBhvr>
-                                        <p:cTn id="21" dur="1" fill="hold">
+                                        <p:cTn id="38" dur="1" fill="hold">
                                           <p:stCondLst>
                                             <p:cond delay="0"/>
                                           </p:stCondLst>
                                         </p:cTn>
                                         <p:tgtEl>
-                                          <p:spTgt spid="3">
-                                            <p:txEl>
-                                              <p:pRg st="3" end="3"/>
-                                            </p:txEl>
-                                          </p:spTgt>
+                                          <p:spTgt spid="5"/>
                                         </p:tgtEl>
                                         <p:attrNameLst>
                                           <p:attrName>style.visibility</p:attrName>
@@ -14375,13 +16435,9 @@
                                     </p:set>
                                     <p:animEffect transition="in" filter="fade">
                                       <p:cBhvr>
-                                        <p:cTn id="22" dur="500"/>
-                                        <p:tgtEl>
-                                          <p:spTgt spid="3">
-                                            <p:txEl>
-                                              <p:pRg st="3" end="3"/>
-                                            </p:txEl>
-                                          </p:spTgt>
+                                        <p:cTn id="39" dur="500"/>
+                                        <p:tgtEl>
+                                          <p:spTgt spid="5"/>
                                         </p:tgtEl>
                                       </p:cBhvr>
                                     </p:animEffect>
@@ -14395,36 +16451,32 @@
                     </p:cTn>
                   </p:par>
                   <p:par>
-                    <p:cTn id="23" fill="hold">
+                    <p:cTn id="40" fill="hold">
                       <p:stCondLst>
                         <p:cond delay="indefinite"/>
                       </p:stCondLst>
                       <p:childTnLst>
                         <p:par>
-                          <p:cTn id="24" fill="hold">
+                          <p:cTn id="41" fill="hold">
                             <p:stCondLst>
                               <p:cond delay="0"/>
                             </p:stCondLst>
                             <p:childTnLst>
                               <p:par>
-                                <p:cTn id="25" presetID="10" presetClass="entr" presetSubtype="0" fill="hold" grpId="0" nodeType="clickEffect">
+                                <p:cTn id="42" presetID="10" presetClass="entr" presetSubtype="0" fill="hold" grpId="0" nodeType="clickEffect">
                                   <p:stCondLst>
                                     <p:cond delay="0"/>
                                   </p:stCondLst>
                                   <p:childTnLst>
                                     <p:set>
                                       <p:cBhvr>
-                                        <p:cTn id="26" dur="1" fill="hold">
+                                        <p:cTn id="43" dur="1" fill="hold">
                                           <p:stCondLst>
                                             <p:cond delay="0"/>
                                           </p:stCondLst>
                                         </p:cTn>
                                         <p:tgtEl>
-                                          <p:spTgt spid="3">
-                                            <p:txEl>
-                                              <p:pRg st="4" end="4"/>
-                                            </p:txEl>
-                                          </p:spTgt>
+                                          <p:spTgt spid="8"/>
                                         </p:tgtEl>
                                         <p:attrNameLst>
                                           <p:attrName>style.visibility</p:attrName>
@@ -14436,13 +16488,44 @@
                                     </p:set>
                                     <p:animEffect transition="in" filter="fade">
                                       <p:cBhvr>
-                                        <p:cTn id="27" dur="500"/>
-                                        <p:tgtEl>
-                                          <p:spTgt spid="3">
-                                            <p:txEl>
-                                              <p:pRg st="4" end="4"/>
-                                            </p:txEl>
-                                          </p:spTgt>
+                                        <p:cTn id="44" dur="500"/>
+                                        <p:tgtEl>
+                                          <p:spTgt spid="8"/>
+                                        </p:tgtEl>
+                                      </p:cBhvr>
+                                    </p:animEffect>
+                                  </p:childTnLst>
+                                </p:cTn>
+                              </p:par>
+                              <p:par>
+                                <p:cTn id="45" presetID="10" presetClass="entr" presetSubtype="0" fill="hold" grpId="0" nodeType="withEffect">
+                                  <p:stCondLst>
+                                    <p:cond delay="0"/>
+                                  </p:stCondLst>
+                                  <p:childTnLst>
+                                    <p:set>
+                                      <p:cBhvr>
+                                        <p:cTn id="46" dur="1" fill="hold">
+                                          <p:stCondLst>
+                                            <p:cond delay="0"/>
+                                          </p:stCondLst>
+                                        </p:cTn>
+                                        <p:tgtEl>
+                                          <p:spTgt spid="10"/>
+                                        </p:tgtEl>
+                                        <p:attrNameLst>
+                                          <p:attrName>style.visibility</p:attrName>
+                                        </p:attrNameLst>
+                                      </p:cBhvr>
+                                      <p:to>
+                                        <p:strVal val="visible"/>
+                                      </p:to>
+                                    </p:set>
+                                    <p:animEffect transition="in" filter="fade">
+                                      <p:cBhvr>
+                                        <p:cTn id="47" dur="500"/>
+                                        <p:tgtEl>
+                                          <p:spTgt spid="10"/>
                                         </p:tgtEl>
                                       </p:cBhvr>
                                     </p:animEffect>
@@ -14456,36 +16539,32 @@
                     </p:cTn>
                   </p:par>
                   <p:par>
-                    <p:cTn id="28" fill="hold">
+                    <p:cTn id="48" fill="hold">
                       <p:stCondLst>
                         <p:cond delay="indefinite"/>
                       </p:stCondLst>
                       <p:childTnLst>
                         <p:par>
-                          <p:cTn id="29" fill="hold">
+                          <p:cTn id="49" fill="hold">
                             <p:stCondLst>
                               <p:cond delay="0"/>
                             </p:stCondLst>
                             <p:childTnLst>
                               <p:par>
-                                <p:cTn id="30" presetID="10" presetClass="entr" presetSubtype="0" fill="hold" grpId="0" nodeType="clickEffect">
+                                <p:cTn id="50" presetID="10" presetClass="entr" presetSubtype="0" fill="hold" grpId="0" nodeType="clickEffect">
                                   <p:stCondLst>
                                     <p:cond delay="0"/>
                                   </p:stCondLst>
                                   <p:childTnLst>
                                     <p:set>
                                       <p:cBhvr>
-                                        <p:cTn id="31" dur="1" fill="hold">
+                                        <p:cTn id="51" dur="1" fill="hold">
                                           <p:stCondLst>
                                             <p:cond delay="0"/>
                                           </p:stCondLst>
                                         </p:cTn>
                                         <p:tgtEl>
-                                          <p:spTgt spid="3">
-                                            <p:txEl>
-                                              <p:pRg st="5" end="5"/>
-                                            </p:txEl>
-                                          </p:spTgt>
+                                          <p:spTgt spid="11"/>
                                         </p:tgtEl>
                                         <p:attrNameLst>
                                           <p:attrName>style.visibility</p:attrName>
@@ -14497,13 +16576,9 @@
                                     </p:set>
                                     <p:animEffect transition="in" filter="fade">
                                       <p:cBhvr>
-                                        <p:cTn id="32" dur="500"/>
-                                        <p:tgtEl>
-                                          <p:spTgt spid="3">
-                                            <p:txEl>
-                                              <p:pRg st="5" end="5"/>
-                                            </p:txEl>
-                                          </p:spTgt>
+                                        <p:cTn id="52" dur="500"/>
+                                        <p:tgtEl>
+                                          <p:spTgt spid="11"/>
                                         </p:tgtEl>
                                       </p:cBhvr>
                                     </p:animEffect>
@@ -14517,120 +16592,76 @@
                     </p:cTn>
                   </p:par>
                   <p:par>
-                    <p:cTn id="33" fill="hold">
+                    <p:cTn id="53" fill="hold">
                       <p:stCondLst>
                         <p:cond delay="indefinite"/>
                       </p:stCondLst>
                       <p:childTnLst>
                         <p:par>
-                          <p:cTn id="34" fill="hold">
+                          <p:cTn id="54" fill="hold">
                             <p:stCondLst>
                               <p:cond delay="0"/>
                             </p:stCondLst>
                             <p:childTnLst>
                               <p:par>
-                                <p:cTn id="35" presetID="10" presetClass="entr" presetSubtype="0" fill="hold" grpId="0" nodeType="clickEffect">
+                                <p:cTn id="55" presetID="10" presetClass="exit" presetSubtype="0" fill="hold" grpId="1" nodeType="clickEffect">
                                   <p:stCondLst>
                                     <p:cond delay="0"/>
                                   </p:stCondLst>
                                   <p:childTnLst>
-                                    <p:set>
-                                      <p:cBhvr>
-                                        <p:cTn id="36" dur="1" fill="hold">
+                                    <p:animEffect transition="out" filter="fade">
+                                      <p:cBhvr>
+                                        <p:cTn id="56" dur="500"/>
+                                        <p:tgtEl>
+                                          <p:spTgt spid="11"/>
+                                        </p:tgtEl>
+                                      </p:cBhvr>
+                                    </p:animEffect>
+                                    <p:set>
+                                      <p:cBhvr>
+                                        <p:cTn id="57" dur="1" fill="hold">
                                           <p:stCondLst>
-                                            <p:cond delay="0"/>
+                                            <p:cond delay="499"/>
                                           </p:stCondLst>
                                         </p:cTn>
                                         <p:tgtEl>
-                                          <p:spTgt spid="7"/>
+                                          <p:spTgt spid="11"/>
                                         </p:tgtEl>
                                         <p:attrNameLst>
                                           <p:attrName>style.visibility</p:attrName>
                                         </p:attrNameLst>
                                       </p:cBhvr>
                                       <p:to>
-                                        <p:strVal val="visible"/>
-                                      </p:to>
-                                    </p:set>
-                                    <p:animEffect transition="in" filter="fade">
-                                      <p:cBhvr>
-                                        <p:cTn id="37" dur="500"/>
-                                        <p:tgtEl>
-                                          <p:spTgt spid="7"/>
-                                        </p:tgtEl>
-                                      </p:cBhvr>
-                                    </p:animEffect>
-                                  </p:childTnLst>
-                                </p:cTn>
-                              </p:par>
-                              <p:par>
-                                <p:cTn id="38" presetID="10" presetClass="entr" presetSubtype="0" fill="hold" grpId="0" nodeType="withEffect">
-                                  <p:stCondLst>
-                                    <p:cond delay="0"/>
-                                  </p:stCondLst>
-                                  <p:childTnLst>
-                                    <p:set>
-                                      <p:cBhvr>
-                                        <p:cTn id="39" dur="1" fill="hold">
-                                          <p:stCondLst>
-                                            <p:cond delay="0"/>
-                                          </p:stCondLst>
-                                        </p:cTn>
-                                        <p:tgtEl>
-                                          <p:spTgt spid="9"/>
-                                        </p:tgtEl>
-                                        <p:attrNameLst>
-                                          <p:attrName>style.visibility</p:attrName>
-                                        </p:attrNameLst>
-                                      </p:cBhvr>
-                                      <p:to>
-                                        <p:strVal val="visible"/>
-                                      </p:to>
-                                    </p:set>
-                                    <p:animEffect transition="in" filter="fade">
-                                      <p:cBhvr>
-                                        <p:cTn id="40" dur="500"/>
-                                        <p:tgtEl>
-                                          <p:spTgt spid="9"/>
-                                        </p:tgtEl>
-                                      </p:cBhvr>
-                                    </p:animEffect>
+                                        <p:strVal val="hidden"/>
+                                      </p:to>
+                                    </p:set>
                                   </p:childTnLst>
                                 </p:cTn>
                               </p:par>
                             </p:childTnLst>
                           </p:cTn>
                         </p:par>
-                      </p:childTnLst>
-                    </p:cTn>
-                  </p:par>
-                  <p:par>
-                    <p:cTn id="41" fill="hold">
-                      <p:stCondLst>
-                        <p:cond delay="indefinite"/>
-                      </p:stCondLst>
-                      <p:childTnLst>
                         <p:par>
-                          <p:cTn id="42" fill="hold">
+                          <p:cTn id="58" fill="hold">
                             <p:stCondLst>
-                              <p:cond delay="0"/>
+                              <p:cond delay="500"/>
                             </p:stCondLst>
                             <p:childTnLst>
                               <p:par>
-                                <p:cTn id="43" presetID="10" presetClass="entr" presetSubtype="0" fill="hold" grpId="0" nodeType="clickEffect">
+                                <p:cTn id="59" presetID="10" presetClass="entr" presetSubtype="0" fill="hold" grpId="0" nodeType="afterEffect">
                                   <p:stCondLst>
                                     <p:cond delay="0"/>
                                   </p:stCondLst>
                                   <p:childTnLst>
                                     <p:set>
                                       <p:cBhvr>
-                                        <p:cTn id="44" dur="1" fill="hold">
+                                        <p:cTn id="60" dur="1" fill="hold">
                                           <p:stCondLst>
                                             <p:cond delay="0"/>
                                           </p:stCondLst>
                                         </p:cTn>
                                         <p:tgtEl>
-                                          <p:spTgt spid="5"/>
+                                          <p:spTgt spid="6"/>
                                         </p:tgtEl>
                                         <p:attrNameLst>
                                           <p:attrName>style.visibility</p:attrName>
@@ -14642,113 +16673,7 @@
                                     </p:set>
                                     <p:animEffect transition="in" filter="fade">
                                       <p:cBhvr>
-                                        <p:cTn id="45" dur="500"/>
-                                        <p:tgtEl>
-                                          <p:spTgt spid="5"/>
-                                        </p:tgtEl>
-                                      </p:cBhvr>
-                                    </p:animEffect>
-                                  </p:childTnLst>
-                                </p:cTn>
-                              </p:par>
-                            </p:childTnLst>
-                          </p:cTn>
-                        </p:par>
-                      </p:childTnLst>
-                    </p:cTn>
-                  </p:par>
-                  <p:par>
-                    <p:cTn id="46" fill="hold">
-                      <p:stCondLst>
-                        <p:cond delay="indefinite"/>
-                      </p:stCondLst>
-                      <p:childTnLst>
-                        <p:par>
-                          <p:cTn id="47" fill="hold">
-                            <p:stCondLst>
-                              <p:cond delay="0"/>
-                            </p:stCondLst>
-                            <p:childTnLst>
-                              <p:par>
-                                <p:cTn id="48" presetID="10" presetClass="entr" presetSubtype="0" fill="hold" grpId="0" nodeType="clickEffect">
-                                  <p:stCondLst>
-                                    <p:cond delay="0"/>
-                                  </p:stCondLst>
-                                  <p:childTnLst>
-                                    <p:set>
-                                      <p:cBhvr>
-                                        <p:cTn id="49" dur="1" fill="hold">
-                                          <p:stCondLst>
-                                            <p:cond delay="0"/>
-                                          </p:stCondLst>
-                                        </p:cTn>
-                                        <p:tgtEl>
-                                          <p:spTgt spid="11"/>
-                                        </p:tgtEl>
-                                        <p:attrNameLst>
-                                          <p:attrName>style.visibility</p:attrName>
-                                        </p:attrNameLst>
-                                      </p:cBhvr>
-                                      <p:to>
-                                        <p:strVal val="visible"/>
-                                      </p:to>
-                                    </p:set>
-                                    <p:animEffect transition="in" filter="fade">
-                                      <p:cBhvr>
-                                        <p:cTn id="50" dur="500"/>
-                                        <p:tgtEl>
-                                          <p:spTgt spid="11"/>
-                                        </p:tgtEl>
-                                      </p:cBhvr>
-                                    </p:animEffect>
-                                  </p:childTnLst>
-                                </p:cTn>
-                              </p:par>
-                            </p:childTnLst>
-                          </p:cTn>
-                        </p:par>
-                      </p:childTnLst>
-                    </p:cTn>
-                  </p:par>
-                  <p:par>
-                    <p:cTn id="51" fill="hold">
-                      <p:stCondLst>
-                        <p:cond delay="indefinite"/>
-                      </p:stCondLst>
-                      <p:childTnLst>
-                        <p:par>
-                          <p:cTn id="52" fill="hold">
-                            <p:stCondLst>
-                              <p:cond delay="0"/>
-                            </p:stCondLst>
-                            <p:childTnLst>
-                              <p:par>
-                                <p:cTn id="53" presetID="10" presetClass="entr" presetSubtype="0" fill="hold" grpId="0" nodeType="clickEffect">
-                                  <p:stCondLst>
-                                    <p:cond delay="0"/>
-                                  </p:stCondLst>
-                                  <p:childTnLst>
-                                    <p:set>
-                                      <p:cBhvr>
-                                        <p:cTn id="54" dur="1" fill="hold">
-                                          <p:stCondLst>
-                                            <p:cond delay="0"/>
-                                          </p:stCondLst>
-                                        </p:cTn>
-                                        <p:tgtEl>
-                                          <p:spTgt spid="6"/>
-                                        </p:tgtEl>
-                                        <p:attrNameLst>
-                                          <p:attrName>style.visibility</p:attrName>
-                                        </p:attrNameLst>
-                                      </p:cBhvr>
-                                      <p:to>
-                                        <p:strVal val="visible"/>
-                                      </p:to>
-                                    </p:set>
-                                    <p:animEffect transition="in" filter="fade">
-                                      <p:cBhvr>
-                                        <p:cTn id="55" dur="500"/>
+                                        <p:cTn id="61" dur="500"/>
                                         <p:tgtEl>
                                           <p:spTgt spid="6"/>
                                         </p:tgtEl>
@@ -14785,12 +16710,15 @@
       </p:par>
     </p:tnLst>
     <p:bldLst>
-      <p:bldP spid="3" grpId="0" build="p"/>
+      <p:bldP spid="3" grpId="0" uiExpand="1" build="p"/>
       <p:bldP spid="5" grpId="0"/>
       <p:bldP spid="6" grpId="0"/>
       <p:bldP spid="7" grpId="0" animBg="1"/>
+      <p:bldP spid="8" grpId="0" animBg="1"/>
       <p:bldP spid="9" grpId="0"/>
+      <p:bldP spid="10" grpId="0"/>
       <p:bldP spid="11" grpId="0"/>
+      <p:bldP spid="11" grpId="1"/>
     </p:bldLst>
   </p:timing>
 </p:sld>
@@ -17290,9 +19218,210 @@
   <p:timing>
     <p:tnLst>
       <p:par>
-        <p:cTn id="1" dur="indefinite" restart="never" nodeType="tmRoot"/>
+        <p:cTn id="1" dur="indefinite" restart="never" nodeType="tmRoot">
+          <p:childTnLst>
+            <p:seq concurrent="1" nextAc="seek">
+              <p:cTn id="2" dur="indefinite" nodeType="mainSeq">
+                <p:childTnLst>
+                  <p:par>
+                    <p:cTn id="3" fill="hold">
+                      <p:stCondLst>
+                        <p:cond delay="indefinite"/>
+                      </p:stCondLst>
+                      <p:childTnLst>
+                        <p:par>
+                          <p:cTn id="4" fill="hold">
+                            <p:stCondLst>
+                              <p:cond delay="0"/>
+                            </p:stCondLst>
+                            <p:childTnLst>
+                              <p:par>
+                                <p:cTn id="5" presetID="10" presetClass="entr" presetSubtype="0" fill="hold" nodeType="clickEffect">
+                                  <p:stCondLst>
+                                    <p:cond delay="0"/>
+                                  </p:stCondLst>
+                                  <p:childTnLst>
+                                    <p:set>
+                                      <p:cBhvr>
+                                        <p:cTn id="6" dur="1" fill="hold">
+                                          <p:stCondLst>
+                                            <p:cond delay="0"/>
+                                          </p:stCondLst>
+                                        </p:cTn>
+                                        <p:tgtEl>
+                                          <p:spTgt spid="3">
+                                            <p:txEl>
+                                              <p:pRg st="1" end="1"/>
+                                            </p:txEl>
+                                          </p:spTgt>
+                                        </p:tgtEl>
+                                        <p:attrNameLst>
+                                          <p:attrName>style.visibility</p:attrName>
+                                        </p:attrNameLst>
+                                      </p:cBhvr>
+                                      <p:to>
+                                        <p:strVal val="visible"/>
+                                      </p:to>
+                                    </p:set>
+                                    <p:animEffect transition="in" filter="fade">
+                                      <p:cBhvr>
+                                        <p:cTn id="7" dur="500"/>
+                                        <p:tgtEl>
+                                          <p:spTgt spid="3">
+                                            <p:txEl>
+                                              <p:pRg st="1" end="1"/>
+                                            </p:txEl>
+                                          </p:spTgt>
+                                        </p:tgtEl>
+                                      </p:cBhvr>
+                                    </p:animEffect>
+                                  </p:childTnLst>
+                                </p:cTn>
+                              </p:par>
+                            </p:childTnLst>
+                          </p:cTn>
+                        </p:par>
+                      </p:childTnLst>
+                    </p:cTn>
+                  </p:par>
+                  <p:par>
+                    <p:cTn id="8" fill="hold">
+                      <p:stCondLst>
+                        <p:cond delay="indefinite"/>
+                      </p:stCondLst>
+                      <p:childTnLst>
+                        <p:par>
+                          <p:cTn id="9" fill="hold">
+                            <p:stCondLst>
+                              <p:cond delay="0"/>
+                            </p:stCondLst>
+                            <p:childTnLst>
+                              <p:par>
+                                <p:cTn id="10" presetID="10" presetClass="entr" presetSubtype="0" fill="hold" nodeType="clickEffect">
+                                  <p:stCondLst>
+                                    <p:cond delay="0"/>
+                                  </p:stCondLst>
+                                  <p:childTnLst>
+                                    <p:set>
+                                      <p:cBhvr>
+                                        <p:cTn id="11" dur="1" fill="hold">
+                                          <p:stCondLst>
+                                            <p:cond delay="0"/>
+                                          </p:stCondLst>
+                                        </p:cTn>
+                                        <p:tgtEl>
+                                          <p:spTgt spid="3">
+                                            <p:txEl>
+                                              <p:pRg st="2" end="2"/>
+                                            </p:txEl>
+                                          </p:spTgt>
+                                        </p:tgtEl>
+                                        <p:attrNameLst>
+                                          <p:attrName>style.visibility</p:attrName>
+                                        </p:attrNameLst>
+                                      </p:cBhvr>
+                                      <p:to>
+                                        <p:strVal val="visible"/>
+                                      </p:to>
+                                    </p:set>
+                                    <p:animEffect transition="in" filter="fade">
+                                      <p:cBhvr>
+                                        <p:cTn id="12" dur="500"/>
+                                        <p:tgtEl>
+                                          <p:spTgt spid="3">
+                                            <p:txEl>
+                                              <p:pRg st="2" end="2"/>
+                                            </p:txEl>
+                                          </p:spTgt>
+                                        </p:tgtEl>
+                                      </p:cBhvr>
+                                    </p:animEffect>
+                                  </p:childTnLst>
+                                </p:cTn>
+                              </p:par>
+                            </p:childTnLst>
+                          </p:cTn>
+                        </p:par>
+                      </p:childTnLst>
+                    </p:cTn>
+                  </p:par>
+                  <p:par>
+                    <p:cTn id="13" fill="hold">
+                      <p:stCondLst>
+                        <p:cond delay="indefinite"/>
+                      </p:stCondLst>
+                      <p:childTnLst>
+                        <p:par>
+                          <p:cTn id="14" fill="hold">
+                            <p:stCondLst>
+                              <p:cond delay="0"/>
+                            </p:stCondLst>
+                            <p:childTnLst>
+                              <p:par>
+                                <p:cTn id="15" presetID="10" presetClass="entr" presetSubtype="0" fill="hold" grpId="0" nodeType="clickEffect">
+                                  <p:stCondLst>
+                                    <p:cond delay="0"/>
+                                  </p:stCondLst>
+                                  <p:childTnLst>
+                                    <p:set>
+                                      <p:cBhvr>
+                                        <p:cTn id="16" dur="1" fill="hold">
+                                          <p:stCondLst>
+                                            <p:cond delay="0"/>
+                                          </p:stCondLst>
+                                        </p:cTn>
+                                        <p:tgtEl>
+                                          <p:spTgt spid="6"/>
+                                        </p:tgtEl>
+                                        <p:attrNameLst>
+                                          <p:attrName>style.visibility</p:attrName>
+                                        </p:attrNameLst>
+                                      </p:cBhvr>
+                                      <p:to>
+                                        <p:strVal val="visible"/>
+                                      </p:to>
+                                    </p:set>
+                                    <p:animEffect transition="in" filter="fade">
+                                      <p:cBhvr>
+                                        <p:cTn id="17" dur="500"/>
+                                        <p:tgtEl>
+                                          <p:spTgt spid="6"/>
+                                        </p:tgtEl>
+                                      </p:cBhvr>
+                                    </p:animEffect>
+                                  </p:childTnLst>
+                                </p:cTn>
+                              </p:par>
+                            </p:childTnLst>
+                          </p:cTn>
+                        </p:par>
+                      </p:childTnLst>
+                    </p:cTn>
+                  </p:par>
+                </p:childTnLst>
+              </p:cTn>
+              <p:prevCondLst>
+                <p:cond evt="onPrev" delay="0">
+                  <p:tgtEl>
+                    <p:sldTgt/>
+                  </p:tgtEl>
+                </p:cond>
+              </p:prevCondLst>
+              <p:nextCondLst>
+                <p:cond evt="onNext" delay="0">
+                  <p:tgtEl>
+                    <p:sldTgt/>
+                  </p:tgtEl>
+                </p:cond>
+              </p:nextCondLst>
+            </p:seq>
+          </p:childTnLst>
+        </p:cTn>
       </p:par>
     </p:tnLst>
+    <p:bldLst>
+      <p:bldP spid="6" grpId="0"/>
+    </p:bldLst>
   </p:timing>
 </p:sld>
 </file>
@@ -17407,9 +19536,157 @@
   <p:timing>
     <p:tnLst>
       <p:par>
-        <p:cTn id="1" dur="indefinite" restart="never" nodeType="tmRoot"/>
+        <p:cTn id="1" dur="indefinite" restart="never" nodeType="tmRoot">
+          <p:childTnLst>
+            <p:seq concurrent="1" nextAc="seek">
+              <p:cTn id="2" dur="indefinite" nodeType="mainSeq">
+                <p:childTnLst>
+                  <p:par>
+                    <p:cTn id="3" fill="hold">
+                      <p:stCondLst>
+                        <p:cond delay="indefinite"/>
+                      </p:stCondLst>
+                      <p:childTnLst>
+                        <p:par>
+                          <p:cTn id="4" fill="hold">
+                            <p:stCondLst>
+                              <p:cond delay="0"/>
+                            </p:stCondLst>
+                            <p:childTnLst>
+                              <p:par>
+                                <p:cTn id="5" presetID="10" presetClass="entr" presetSubtype="0" fill="hold" grpId="0" nodeType="clickEffect">
+                                  <p:stCondLst>
+                                    <p:cond delay="0"/>
+                                  </p:stCondLst>
+                                  <p:childTnLst>
+                                    <p:set>
+                                      <p:cBhvr>
+                                        <p:cTn id="6" dur="1" fill="hold">
+                                          <p:stCondLst>
+                                            <p:cond delay="0"/>
+                                          </p:stCondLst>
+                                        </p:cTn>
+                                        <p:tgtEl>
+                                          <p:spTgt spid="3">
+                                            <p:txEl>
+                                              <p:pRg st="0" end="0"/>
+                                            </p:txEl>
+                                          </p:spTgt>
+                                        </p:tgtEl>
+                                        <p:attrNameLst>
+                                          <p:attrName>style.visibility</p:attrName>
+                                        </p:attrNameLst>
+                                      </p:cBhvr>
+                                      <p:to>
+                                        <p:strVal val="visible"/>
+                                      </p:to>
+                                    </p:set>
+                                    <p:animEffect transition="in" filter="fade">
+                                      <p:cBhvr>
+                                        <p:cTn id="7" dur="500"/>
+                                        <p:tgtEl>
+                                          <p:spTgt spid="3">
+                                            <p:txEl>
+                                              <p:pRg st="0" end="0"/>
+                                            </p:txEl>
+                                          </p:spTgt>
+                                        </p:tgtEl>
+                                      </p:cBhvr>
+                                    </p:animEffect>
+                                  </p:childTnLst>
+                                </p:cTn>
+                              </p:par>
+                            </p:childTnLst>
+                          </p:cTn>
+                        </p:par>
+                      </p:childTnLst>
+                    </p:cTn>
+                  </p:par>
+                  <p:par>
+                    <p:cTn id="8" fill="hold">
+                      <p:stCondLst>
+                        <p:cond delay="indefinite"/>
+                      </p:stCondLst>
+                      <p:childTnLst>
+                        <p:par>
+                          <p:cTn id="9" fill="hold">
+                            <p:stCondLst>
+                              <p:cond delay="0"/>
+                            </p:stCondLst>
+                            <p:childTnLst>
+                              <p:par>
+                                <p:cTn id="10" presetID="10" presetClass="entr" presetSubtype="0" fill="hold" grpId="0" nodeType="clickEffect">
+                                  <p:stCondLst>
+                                    <p:cond delay="0"/>
+                                  </p:stCondLst>
+                                  <p:childTnLst>
+                                    <p:set>
+                                      <p:cBhvr>
+                                        <p:cTn id="11" dur="1" fill="hold">
+                                          <p:stCondLst>
+                                            <p:cond delay="0"/>
+                                          </p:stCondLst>
+                                        </p:cTn>
+                                        <p:tgtEl>
+                                          <p:spTgt spid="3">
+                                            <p:txEl>
+                                              <p:pRg st="1" end="1"/>
+                                            </p:txEl>
+                                          </p:spTgt>
+                                        </p:tgtEl>
+                                        <p:attrNameLst>
+                                          <p:attrName>style.visibility</p:attrName>
+                                        </p:attrNameLst>
+                                      </p:cBhvr>
+                                      <p:to>
+                                        <p:strVal val="visible"/>
+                                      </p:to>
+                                    </p:set>
+                                    <p:animEffect transition="in" filter="fade">
+                                      <p:cBhvr>
+                                        <p:cTn id="12" dur="500"/>
+                                        <p:tgtEl>
+                                          <p:spTgt spid="3">
+                                            <p:txEl>
+                                              <p:pRg st="1" end="1"/>
+                                            </p:txEl>
+                                          </p:spTgt>
+                                        </p:tgtEl>
+                                      </p:cBhvr>
+                                    </p:animEffect>
+                                  </p:childTnLst>
+                                </p:cTn>
+                              </p:par>
+                            </p:childTnLst>
+                          </p:cTn>
+                        </p:par>
+                      </p:childTnLst>
+                    </p:cTn>
+                  </p:par>
+                </p:childTnLst>
+              </p:cTn>
+              <p:prevCondLst>
+                <p:cond evt="onPrev" delay="0">
+                  <p:tgtEl>
+                    <p:sldTgt/>
+                  </p:tgtEl>
+                </p:cond>
+              </p:prevCondLst>
+              <p:nextCondLst>
+                <p:cond evt="onNext" delay="0">
+                  <p:tgtEl>
+                    <p:sldTgt/>
+                  </p:tgtEl>
+                </p:cond>
+              </p:nextCondLst>
+            </p:seq>
+          </p:childTnLst>
+        </p:cTn>
       </p:par>
     </p:tnLst>
+    <p:bldLst>
+      <p:bldP spid="3" grpId="0" build="p"/>
+    </p:bldLst>
   </p:timing>
 </p:sld>
 </file>

</xml_diff>